<commit_message>
update ppt + class diag + QML app
</commit_message>
<xml_diff>
--- a/weathercheckingrpi/doc/Presentations/projet_meteo_JL_KG_16042019v1.pptx
+++ b/weathercheckingrpi/doc/Presentations/projet_meteo_JL_KG_16042019v1.pptx
@@ -5,7 +5,7 @@
     <p:sldMasterId id="2147483648" r:id="rId1"/>
   </p:sldMasterIdLst>
   <p:notesMasterIdLst>
-    <p:notesMasterId r:id="rId16"/>
+    <p:notesMasterId r:id="rId21"/>
   </p:notesMasterIdLst>
   <p:sldIdLst>
     <p:sldId id="256" r:id="rId2"/>
@@ -13,15 +13,20 @@
     <p:sldId id="267" r:id="rId4"/>
     <p:sldId id="268" r:id="rId5"/>
     <p:sldId id="261" r:id="rId6"/>
-    <p:sldId id="258" r:id="rId7"/>
-    <p:sldId id="260" r:id="rId8"/>
-    <p:sldId id="269" r:id="rId9"/>
-    <p:sldId id="262" r:id="rId10"/>
-    <p:sldId id="259" r:id="rId11"/>
-    <p:sldId id="263" r:id="rId12"/>
-    <p:sldId id="264" r:id="rId13"/>
-    <p:sldId id="265" r:id="rId14"/>
-    <p:sldId id="266" r:id="rId15"/>
+    <p:sldId id="275" r:id="rId7"/>
+    <p:sldId id="258" r:id="rId8"/>
+    <p:sldId id="260" r:id="rId9"/>
+    <p:sldId id="269" r:id="rId10"/>
+    <p:sldId id="262" r:id="rId11"/>
+    <p:sldId id="270" r:id="rId12"/>
+    <p:sldId id="271" r:id="rId13"/>
+    <p:sldId id="272" r:id="rId14"/>
+    <p:sldId id="273" r:id="rId15"/>
+    <p:sldId id="274" r:id="rId16"/>
+    <p:sldId id="263" r:id="rId17"/>
+    <p:sldId id="264" r:id="rId18"/>
+    <p:sldId id="265" r:id="rId19"/>
+    <p:sldId id="266" r:id="rId20"/>
   </p:sldIdLst>
   <p:sldSz cx="12192000" cy="6858000"/>
   <p:notesSz cx="6858000" cy="9144000"/>
@@ -210,7 +215,7 @@
           <a:p>
             <a:fld id="{6161BC85-0027-4007-9338-1650892E49B7}" type="datetimeFigureOut">
               <a:rPr lang="en-US" smtClean="0"/>
-              <a:t>4/16/2019</a:t>
+              <a:t>4/17/2019</a:t>
             </a:fld>
             <a:endParaRPr lang="en-US"/>
           </a:p>
@@ -627,7 +632,7 @@
           <a:p>
             <a:fld id="{E1E288B8-7CF0-4936-8894-E29E620520A4}" type="datetime1">
               <a:rPr lang="en-US" smtClean="0"/>
-              <a:t>4/16/2019</a:t>
+              <a:t>4/17/2019</a:t>
             </a:fld>
             <a:endParaRPr lang="en-US"/>
           </a:p>
@@ -827,7 +832,7 @@
           <a:p>
             <a:fld id="{D6057DF6-74B6-44BB-8F12-8F41B401CA5B}" type="datetime1">
               <a:rPr lang="en-US" smtClean="0"/>
-              <a:t>4/16/2019</a:t>
+              <a:t>4/17/2019</a:t>
             </a:fld>
             <a:endParaRPr lang="en-US"/>
           </a:p>
@@ -1037,7 +1042,7 @@
           <a:p>
             <a:fld id="{491C77AF-4675-4427-9296-EE2DA3D6CCBA}" type="datetime1">
               <a:rPr lang="en-US" smtClean="0"/>
-              <a:t>4/16/2019</a:t>
+              <a:t>4/17/2019</a:t>
             </a:fld>
             <a:endParaRPr lang="en-US"/>
           </a:p>
@@ -1237,7 +1242,7 @@
           <a:p>
             <a:fld id="{4F4DDEAF-B0E2-4056-9E30-B7498786D97E}" type="datetime1">
               <a:rPr lang="en-US" smtClean="0"/>
-              <a:t>4/16/2019</a:t>
+              <a:t>4/17/2019</a:t>
             </a:fld>
             <a:endParaRPr lang="en-US"/>
           </a:p>
@@ -1513,7 +1518,7 @@
           <a:p>
             <a:fld id="{648218BD-BE7A-4DD1-A5EF-2B7B7C661B01}" type="datetime1">
               <a:rPr lang="en-US" smtClean="0"/>
-              <a:t>4/16/2019</a:t>
+              <a:t>4/17/2019</a:t>
             </a:fld>
             <a:endParaRPr lang="en-US"/>
           </a:p>
@@ -1781,7 +1786,7 @@
           <a:p>
             <a:fld id="{224BC7D6-A86C-41BC-8F2B-4929DECDC99B}" type="datetime1">
               <a:rPr lang="en-US" smtClean="0"/>
-              <a:t>4/16/2019</a:t>
+              <a:t>4/17/2019</a:t>
             </a:fld>
             <a:endParaRPr lang="en-US"/>
           </a:p>
@@ -2196,7 +2201,7 @@
           <a:p>
             <a:fld id="{204F952B-7BFE-4587-9FDC-522258B61562}" type="datetime1">
               <a:rPr lang="en-US" smtClean="0"/>
-              <a:t>4/16/2019</a:t>
+              <a:t>4/17/2019</a:t>
             </a:fld>
             <a:endParaRPr lang="en-US"/>
           </a:p>
@@ -2338,7 +2343,7 @@
           <a:p>
             <a:fld id="{D86D5636-13A5-48E5-B764-618D3B523716}" type="datetime1">
               <a:rPr lang="en-US" smtClean="0"/>
-              <a:t>4/16/2019</a:t>
+              <a:t>4/17/2019</a:t>
             </a:fld>
             <a:endParaRPr lang="en-US"/>
           </a:p>
@@ -2451,7 +2456,7 @@
           <a:p>
             <a:fld id="{697412DF-611E-49CD-B0F2-1C01921090F8}" type="datetime1">
               <a:rPr lang="en-US" smtClean="0"/>
-              <a:t>4/16/2019</a:t>
+              <a:t>4/17/2019</a:t>
             </a:fld>
             <a:endParaRPr lang="en-US"/>
           </a:p>
@@ -2764,7 +2769,7 @@
           <a:p>
             <a:fld id="{7DA9CC4D-68F7-40F0-AB33-47E334E82B1A}" type="datetime1">
               <a:rPr lang="en-US" smtClean="0"/>
-              <a:t>4/16/2019</a:t>
+              <a:t>4/17/2019</a:t>
             </a:fld>
             <a:endParaRPr lang="en-US"/>
           </a:p>
@@ -3053,7 +3058,7 @@
           <a:p>
             <a:fld id="{2F24B594-DA0A-4A6C-B8B3-1AAF69EB71BB}" type="datetime1">
               <a:rPr lang="en-US" smtClean="0"/>
-              <a:t>4/16/2019</a:t>
+              <a:t>4/17/2019</a:t>
             </a:fld>
             <a:endParaRPr lang="en-US"/>
           </a:p>
@@ -3296,7 +3301,7 @@
           <a:p>
             <a:fld id="{85E1C72D-90AD-4049-B90E-9B0437977241}" type="datetime1">
               <a:rPr lang="en-US" smtClean="0"/>
-              <a:t>4/16/2019</a:t>
+              <a:t>4/17/2019</a:t>
             </a:fld>
             <a:endParaRPr lang="en-US"/>
           </a:p>
@@ -3912,7 +3917,7 @@
           <p:cNvPr id="2" name="Titre 1">
             <a:extLst>
               <a:ext uri="{FF2B5EF4-FFF2-40B4-BE49-F238E27FC236}">
-                <a16:creationId xmlns:a16="http://schemas.microsoft.com/office/drawing/2014/main" id="{3AF07638-9565-4B1C-AC88-E043C518A0B4}"/>
+                <a16:creationId xmlns:a16="http://schemas.microsoft.com/office/drawing/2014/main" id="{FF4F4BAF-F1D7-4C98-B1D6-D186AC154381}"/>
               </a:ext>
             </a:extLst>
           </p:cNvPr>
@@ -3923,18 +3928,19 @@
             <p:ph type="title"/>
           </p:nvPr>
         </p:nvSpPr>
-        <p:spPr/>
+        <p:spPr>
+          <a:xfrm>
+            <a:off x="838200" y="263525"/>
+            <a:ext cx="10515600" cy="1325563"/>
+          </a:xfrm>
+        </p:spPr>
         <p:txBody>
           <a:bodyPr/>
           <a:lstStyle/>
           <a:p>
             <a:r>
               <a:rPr lang="fr-FR" dirty="0"/>
-              <a:t>Algorithme de </a:t>
-            </a:r>
-            <a:r>
-              <a:rPr lang="fr-FR" dirty="0" err="1"/>
-              <a:t>Zambretti</a:t>
+              <a:t>Historisation des métriques météo</a:t>
             </a:r>
             <a:endParaRPr lang="en-US" dirty="0"/>
           </a:p>
@@ -3942,35 +3948,10 @@
       </p:sp>
       <p:sp>
         <p:nvSpPr>
-          <p:cNvPr id="3" name="Espace réservé du contenu 2">
-            <a:extLst>
-              <a:ext uri="{FF2B5EF4-FFF2-40B4-BE49-F238E27FC236}">
-                <a16:creationId xmlns:a16="http://schemas.microsoft.com/office/drawing/2014/main" id="{662C461C-D854-4313-B117-059D50FE43BF}"/>
-              </a:ext>
-            </a:extLst>
-          </p:cNvPr>
-          <p:cNvSpPr>
-            <a:spLocks noGrp="1"/>
-          </p:cNvSpPr>
-          <p:nvPr>
-            <p:ph idx="1"/>
-          </p:nvPr>
-        </p:nvSpPr>
-        <p:spPr/>
-        <p:txBody>
-          <a:bodyPr/>
-          <a:lstStyle/>
-          <a:p>
-            <a:endParaRPr lang="en-US"/>
-          </a:p>
-        </p:txBody>
-      </p:sp>
-      <p:sp>
-        <p:nvSpPr>
           <p:cNvPr id="4" name="Espace réservé du numéro de diapositive 3">
             <a:extLst>
               <a:ext uri="{FF2B5EF4-FFF2-40B4-BE49-F238E27FC236}">
-                <a16:creationId xmlns:a16="http://schemas.microsoft.com/office/drawing/2014/main" id="{7BBF96B4-0286-4EB5-9AC5-241D9BE207C7}"/>
+                <a16:creationId xmlns:a16="http://schemas.microsoft.com/office/drawing/2014/main" id="{B279120F-2810-42A6-BD3B-5C40AAFD7CE5}"/>
               </a:ext>
             </a:extLst>
           </p:cNvPr>
@@ -3997,7 +3978,7 @@
     </p:spTree>
     <p:extLst>
       <p:ext uri="{BB962C8B-B14F-4D97-AF65-F5344CB8AC3E}">
-        <p14:creationId xmlns:p14="http://schemas.microsoft.com/office/powerpoint/2010/main" val="895405553"/>
+        <p14:creationId xmlns:p14="http://schemas.microsoft.com/office/powerpoint/2010/main" val="3829008188"/>
       </p:ext>
     </p:extLst>
   </p:cSld>
@@ -4026,13 +4007,7 @@
       </p:grpSpPr>
       <p:sp>
         <p:nvSpPr>
-          <p:cNvPr id="2" name="Titre 1">
-            <a:extLst>
-              <a:ext uri="{FF2B5EF4-FFF2-40B4-BE49-F238E27FC236}">
-                <a16:creationId xmlns:a16="http://schemas.microsoft.com/office/drawing/2014/main" id="{C7BE326B-715B-4426-BD4C-06E41100F853}"/>
-              </a:ext>
-            </a:extLst>
-          </p:cNvPr>
+          <p:cNvPr id="4" name="Titre 3"/>
           <p:cNvSpPr>
             <a:spLocks noGrp="1"/>
           </p:cNvSpPr>
@@ -4040,49 +4015,96 @@
             <p:ph type="title"/>
           </p:nvPr>
         </p:nvSpPr>
-        <p:spPr/>
-        <p:txBody>
-          <a:bodyPr/>
-          <a:lstStyle/>
-          <a:p>
-            <a:r>
-              <a:rPr lang="fr-FR" dirty="0"/>
-              <a:t>Tests</a:t>
-            </a:r>
-            <a:endParaRPr lang="en-US" dirty="0"/>
-          </a:p>
-        </p:txBody>
-      </p:sp>
-      <p:sp>
-        <p:nvSpPr>
-          <p:cNvPr id="3" name="Espace réservé du contenu 2">
-            <a:extLst>
-              <a:ext uri="{FF2B5EF4-FFF2-40B4-BE49-F238E27FC236}">
-                <a16:creationId xmlns:a16="http://schemas.microsoft.com/office/drawing/2014/main" id="{C8EC75DF-2FB2-4388-B226-AD8772E82D5C}"/>
-              </a:ext>
-            </a:extLst>
-          </p:cNvPr>
-          <p:cNvSpPr>
-            <a:spLocks noGrp="1"/>
-          </p:cNvSpPr>
-          <p:nvPr>
-            <p:ph idx="1"/>
-          </p:nvPr>
-        </p:nvSpPr>
-        <p:spPr/>
-        <p:txBody>
-          <a:bodyPr/>
-          <a:lstStyle/>
-          <a:p>
-            <a:r>
-              <a:rPr lang="fr-FR" dirty="0"/>
-              <a:t>Environnement de suite de tests unitaires </a:t>
-            </a:r>
+        <p:spPr>
+          <a:xfrm>
+            <a:off x="1881158" y="357166"/>
+            <a:ext cx="8229600" cy="631844"/>
+          </a:xfrm>
+        </p:spPr>
+        <p:txBody>
+          <a:bodyPr>
+            <a:normAutofit fontScale="90000"/>
+          </a:bodyPr>
+          <a:lstStyle/>
+          <a:p>
+            <a:r>
+              <a:rPr lang="fr-FR" sz="4000" dirty="0" err="1"/>
+              <a:t>Negretti</a:t>
+            </a:r>
+            <a:r>
+              <a:rPr lang="fr-FR" sz="4000" dirty="0"/>
+              <a:t> &amp; </a:t>
+            </a:r>
+            <a:r>
+              <a:rPr lang="fr-FR" sz="4000" dirty="0" err="1"/>
+              <a:t>Zambra</a:t>
+            </a:r>
+            <a:endParaRPr lang="fr-FR" sz="4000" dirty="0"/>
+          </a:p>
+        </p:txBody>
+      </p:sp>
+      <p:pic>
+        <p:nvPicPr>
+          <p:cNvPr id="8" name="Image 7" descr="works.jpg"/>
+          <p:cNvPicPr>
+            <a:picLocks noChangeAspect="1"/>
+          </p:cNvPicPr>
+          <p:nvPr/>
+        </p:nvPicPr>
+        <p:blipFill>
+          <a:blip r:embed="rId2"/>
+          <a:stretch>
+            <a:fillRect/>
+          </a:stretch>
+        </p:blipFill>
+        <p:spPr>
+          <a:xfrm>
+            <a:off x="2595539" y="1428736"/>
+            <a:ext cx="3127053" cy="4786306"/>
+          </a:xfrm>
+          <a:prstGeom prst="rect">
+            <a:avLst/>
+          </a:prstGeom>
+        </p:spPr>
+      </p:pic>
+      <p:sp>
+        <p:nvSpPr>
+          <p:cNvPr id="9" name="ZoneTexte 8"/>
+          <p:cNvSpPr txBox="1"/>
+          <p:nvPr/>
+        </p:nvSpPr>
+        <p:spPr>
+          <a:xfrm>
+            <a:off x="6238876" y="1225690"/>
+            <a:ext cx="3571900" cy="5078313"/>
+          </a:xfrm>
+          <a:prstGeom prst="rect">
+            <a:avLst/>
+          </a:prstGeom>
+          <a:noFill/>
+        </p:spPr>
+        <p:txBody>
+          <a:bodyPr wrap="square" rtlCol="0">
+            <a:spAutoFit/>
+          </a:bodyPr>
+          <a:lstStyle/>
+          <a:p>
             <a:r>
               <a:rPr lang="fr-FR" dirty="0" err="1"/>
-              <a:t>cppunit</a:t>
-            </a:r>
-            <a:endParaRPr lang="en-US" dirty="0"/>
+              <a:t>Negretti</a:t>
+            </a:r>
+            <a:r>
+              <a:rPr lang="fr-FR" dirty="0"/>
+              <a:t> et </a:t>
+            </a:r>
+            <a:r>
+              <a:rPr lang="fr-FR" dirty="0" err="1"/>
+              <a:t>Zambra</a:t>
+            </a:r>
+            <a:r>
+              <a:rPr lang="fr-FR" dirty="0"/>
+              <a:t>: Londres</a:t>
+            </a:r>
           </a:p>
           <a:p>
             <a:endParaRPr lang="fr-FR" dirty="0"/>
@@ -4090,53 +4112,154 @@
           <a:p>
             <a:r>
               <a:rPr lang="fr-FR" dirty="0"/>
-              <a:t>Cas:</a:t>
-            </a:r>
-          </a:p>
-          <a:p>
-            <a:pPr lvl="1"/>
-            <a:r>
-              <a:rPr lang="fr-FR" dirty="0"/>
-              <a:t> Pas de mesures produites par les capteurs</a:t>
-            </a:r>
-          </a:p>
-        </p:txBody>
-      </p:sp>
-      <p:sp>
-        <p:nvSpPr>
-          <p:cNvPr id="4" name="Espace réservé du numéro de diapositive 3">
-            <a:extLst>
-              <a:ext uri="{FF2B5EF4-FFF2-40B4-BE49-F238E27FC236}">
-                <a16:creationId xmlns:a16="http://schemas.microsoft.com/office/drawing/2014/main" id="{5E5734B6-7182-4A17-8C04-B19EB308B116}"/>
-              </a:ext>
-            </a:extLst>
-          </p:cNvPr>
-          <p:cNvSpPr>
-            <a:spLocks noGrp="1"/>
-          </p:cNvSpPr>
-          <p:nvPr>
-            <p:ph type="sldNum" sz="quarter" idx="12"/>
-          </p:nvPr>
-        </p:nvSpPr>
-        <p:spPr/>
-        <p:txBody>
-          <a:bodyPr/>
-          <a:lstStyle/>
-          <a:p>
-            <a:fld id="{B4C56C5B-B224-400D-A2FE-072C37A0476F}" type="slidenum">
-              <a:rPr lang="en-US" smtClean="0"/>
-              <a:t>11</a:t>
-            </a:fld>
-            <a:endParaRPr lang="en-US"/>
+              <a:t>Fondateurs:</a:t>
+            </a:r>
+          </a:p>
+          <a:p>
+            <a:r>
+              <a:rPr lang="fr-FR" dirty="0"/>
+              <a:t>Henry </a:t>
+            </a:r>
+            <a:r>
+              <a:rPr lang="fr-FR" dirty="0" err="1"/>
+              <a:t>Negretti</a:t>
+            </a:r>
+            <a:r>
+              <a:rPr lang="fr-FR" dirty="0"/>
+              <a:t> (1818–1879)</a:t>
+            </a:r>
+          </a:p>
+          <a:p>
+            <a:r>
+              <a:rPr lang="fr-FR" dirty="0"/>
+              <a:t>Joseph </a:t>
+            </a:r>
+            <a:r>
+              <a:rPr lang="fr-FR" dirty="0" err="1"/>
+              <a:t>Zambra</a:t>
+            </a:r>
+            <a:r>
+              <a:rPr lang="fr-FR" dirty="0"/>
+              <a:t> (1822–1897)</a:t>
+            </a:r>
+          </a:p>
+          <a:p>
+            <a:endParaRPr lang="fr-FR" dirty="0"/>
+          </a:p>
+          <a:p>
+            <a:pPr>
+              <a:buFont typeface="Arial" pitchFamily="34" charset="0"/>
+              <a:buChar char="•"/>
+            </a:pPr>
+            <a:r>
+              <a:rPr lang="fr-FR" i="1" dirty="0"/>
+              <a:t> A </a:t>
+            </a:r>
+            <a:r>
+              <a:rPr lang="fr-FR" i="1" dirty="0" err="1"/>
+              <a:t>Treatise</a:t>
+            </a:r>
+            <a:r>
+              <a:rPr lang="fr-FR" i="1" dirty="0"/>
+              <a:t> on </a:t>
+            </a:r>
+            <a:r>
+              <a:rPr lang="fr-FR" i="1" dirty="0" err="1"/>
+              <a:t>Meteorological</a:t>
+            </a:r>
+            <a:r>
+              <a:rPr lang="fr-FR" i="1" dirty="0"/>
+              <a:t> Instruments</a:t>
+            </a:r>
+            <a:r>
+              <a:rPr lang="fr-FR" dirty="0"/>
+              <a:t> </a:t>
+            </a:r>
+          </a:p>
+          <a:p>
+            <a:endParaRPr lang="fr-FR" dirty="0"/>
+          </a:p>
+          <a:p>
+            <a:pPr>
+              <a:buFont typeface="Arial" pitchFamily="34" charset="0"/>
+              <a:buChar char="•"/>
+            </a:pPr>
+            <a:r>
+              <a:rPr lang="fr-FR" dirty="0"/>
+              <a:t> Optiques</a:t>
+            </a:r>
+          </a:p>
+          <a:p>
+            <a:pPr>
+              <a:buFont typeface="Arial" pitchFamily="34" charset="0"/>
+              <a:buChar char="•"/>
+            </a:pPr>
+            <a:r>
+              <a:rPr lang="fr-FR" dirty="0"/>
+              <a:t> Thermomètres</a:t>
+            </a:r>
+          </a:p>
+          <a:p>
+            <a:pPr>
+              <a:buFont typeface="Arial" pitchFamily="34" charset="0"/>
+              <a:buChar char="•"/>
+            </a:pPr>
+            <a:r>
+              <a:rPr lang="fr-FR" dirty="0"/>
+              <a:t> Lunettes astronomiques</a:t>
+            </a:r>
+          </a:p>
+          <a:p>
+            <a:pPr>
+              <a:buFont typeface="Arial" pitchFamily="34" charset="0"/>
+              <a:buChar char="•"/>
+            </a:pPr>
+            <a:r>
+              <a:rPr lang="fr-FR" dirty="0"/>
+              <a:t> Photo</a:t>
+            </a:r>
+          </a:p>
+          <a:p>
+            <a:pPr>
+              <a:buFont typeface="Arial" pitchFamily="34" charset="0"/>
+              <a:buChar char="•"/>
+            </a:pPr>
+            <a:endParaRPr lang="fr-FR" dirty="0"/>
+          </a:p>
+          <a:p>
+            <a:pPr>
+              <a:buFont typeface="Arial" pitchFamily="34" charset="0"/>
+              <a:buChar char="•"/>
+            </a:pPr>
+            <a:r>
+              <a:rPr lang="fr-FR" dirty="0"/>
+              <a:t> Expéditions (Egypte, Chine, Japon)</a:t>
+            </a:r>
+          </a:p>
+          <a:p>
+            <a:pPr>
+              <a:buFont typeface="Arial" pitchFamily="34" charset="0"/>
+              <a:buChar char="•"/>
+            </a:pPr>
+            <a:r>
+              <a:rPr lang="fr-FR" dirty="0"/>
+              <a:t> </a:t>
+            </a:r>
+            <a:r>
+              <a:rPr lang="fr-FR" dirty="0" err="1"/>
+              <a:t>Queen</a:t>
+            </a:r>
+            <a:r>
+              <a:rPr lang="fr-FR" dirty="0"/>
+              <a:t> Victoria, Prince Albert, Edouard VII …</a:t>
+            </a:r>
+          </a:p>
+          <a:p>
+            <a:endParaRPr lang="fr-FR" dirty="0"/>
           </a:p>
         </p:txBody>
       </p:sp>
     </p:spTree>
-    <p:extLst>
-      <p:ext uri="{BB962C8B-B14F-4D97-AF65-F5344CB8AC3E}">
-        <p14:creationId xmlns:p14="http://schemas.microsoft.com/office/powerpoint/2010/main" val="4026249942"/>
-      </p:ext>
-    </p:extLst>
   </p:cSld>
   <p:clrMapOvr>
     <a:masterClrMapping/>
@@ -4161,15 +4284,57 @@
           <a:chExt cx="0" cy="0"/>
         </a:xfrm>
       </p:grpSpPr>
-      <p:sp>
-        <p:nvSpPr>
-          <p:cNvPr id="2" name="Titre 1">
-            <a:extLst>
-              <a:ext uri="{FF2B5EF4-FFF2-40B4-BE49-F238E27FC236}">
-                <a16:creationId xmlns:a16="http://schemas.microsoft.com/office/drawing/2014/main" id="{C7BE326B-715B-4426-BD4C-06E41100F853}"/>
-              </a:ext>
-            </a:extLst>
-          </p:cNvPr>
+      <p:pic>
+        <p:nvPicPr>
+          <p:cNvPr id="3" name="Image 2" descr="old_zambretti.jpg"/>
+          <p:cNvPicPr>
+            <a:picLocks noChangeAspect="1"/>
+          </p:cNvPicPr>
+          <p:nvPr/>
+        </p:nvPicPr>
+        <p:blipFill>
+          <a:blip r:embed="rId2"/>
+          <a:stretch>
+            <a:fillRect/>
+          </a:stretch>
+        </p:blipFill>
+        <p:spPr>
+          <a:xfrm>
+            <a:off x="2381224" y="1357299"/>
+            <a:ext cx="3143272" cy="3446373"/>
+          </a:xfrm>
+          <a:prstGeom prst="rect">
+            <a:avLst/>
+          </a:prstGeom>
+        </p:spPr>
+      </p:pic>
+      <p:pic>
+        <p:nvPicPr>
+          <p:cNvPr id="4" name="Image 3" descr="th.jpg"/>
+          <p:cNvPicPr>
+            <a:picLocks noChangeAspect="1"/>
+          </p:cNvPicPr>
+          <p:nvPr/>
+        </p:nvPicPr>
+        <p:blipFill>
+          <a:blip r:embed="rId3"/>
+          <a:stretch>
+            <a:fillRect/>
+          </a:stretch>
+        </p:blipFill>
+        <p:spPr>
+          <a:xfrm>
+            <a:off x="7381885" y="3643314"/>
+            <a:ext cx="2703451" cy="2643206"/>
+          </a:xfrm>
+          <a:prstGeom prst="rect">
+            <a:avLst/>
+          </a:prstGeom>
+        </p:spPr>
+      </p:pic>
+      <p:sp>
+        <p:nvSpPr>
+          <p:cNvPr id="5" name="Titre 3"/>
           <p:cNvSpPr>
             <a:spLocks noGrp="1"/>
           </p:cNvSpPr>
@@ -4177,97 +4342,430 @@
             <p:ph type="title"/>
           </p:nvPr>
         </p:nvSpPr>
-        <p:spPr/>
-        <p:txBody>
-          <a:bodyPr/>
-          <a:lstStyle/>
-          <a:p>
-            <a:r>
-              <a:rPr lang="fr-FR" dirty="0"/>
-              <a:t>Déploiement: installation par paquet Debian</a:t>
-            </a:r>
-            <a:endParaRPr lang="en-US" dirty="0"/>
-          </a:p>
-        </p:txBody>
-      </p:sp>
-      <p:sp>
-        <p:nvSpPr>
-          <p:cNvPr id="3" name="Espace réservé du contenu 2">
-            <a:extLst>
-              <a:ext uri="{FF2B5EF4-FFF2-40B4-BE49-F238E27FC236}">
-                <a16:creationId xmlns:a16="http://schemas.microsoft.com/office/drawing/2014/main" id="{C8EC75DF-2FB2-4388-B226-AD8772E82D5C}"/>
-              </a:ext>
-            </a:extLst>
-          </p:cNvPr>
-          <p:cNvSpPr>
-            <a:spLocks noGrp="1"/>
-          </p:cNvSpPr>
-          <p:nvPr>
-            <p:ph idx="1"/>
-          </p:nvPr>
-        </p:nvSpPr>
-        <p:spPr/>
-        <p:txBody>
-          <a:bodyPr/>
-          <a:lstStyle/>
-          <a:p>
-            <a:r>
-              <a:rPr lang="fr-FR" dirty="0"/>
-              <a:t>Téléchargement depuis GitHub du paquet contenant le binaire</a:t>
-            </a:r>
-          </a:p>
-          <a:p>
-            <a:r>
-              <a:rPr lang="fr-FR" dirty="0"/>
-              <a:t>Installation avec </a:t>
-            </a:r>
-            <a:r>
-              <a:rPr lang="fr-FR" dirty="0" err="1"/>
-              <a:t>dpkg</a:t>
-            </a:r>
-            <a:r>
-              <a:rPr lang="fr-FR" dirty="0"/>
-              <a:t> –i &lt;nom de l’application&gt;</a:t>
-            </a:r>
-            <a:endParaRPr lang="en-US" dirty="0"/>
-          </a:p>
-        </p:txBody>
-      </p:sp>
-      <p:sp>
-        <p:nvSpPr>
-          <p:cNvPr id="4" name="Espace réservé du numéro de diapositive 3">
-            <a:extLst>
-              <a:ext uri="{FF2B5EF4-FFF2-40B4-BE49-F238E27FC236}">
-                <a16:creationId xmlns:a16="http://schemas.microsoft.com/office/drawing/2014/main" id="{5E5734B6-7182-4A17-8C04-B19EB308B116}"/>
-              </a:ext>
-            </a:extLst>
-          </p:cNvPr>
-          <p:cNvSpPr>
-            <a:spLocks noGrp="1"/>
-          </p:cNvSpPr>
-          <p:nvPr>
-            <p:ph type="sldNum" sz="quarter" idx="12"/>
-          </p:nvPr>
-        </p:nvSpPr>
-        <p:spPr/>
-        <p:txBody>
-          <a:bodyPr/>
-          <a:lstStyle/>
-          <a:p>
-            <a:fld id="{B4C56C5B-B224-400D-A2FE-072C37A0476F}" type="slidenum">
-              <a:rPr lang="en-US" smtClean="0"/>
-              <a:t>12</a:t>
-            </a:fld>
-            <a:endParaRPr lang="en-US"/>
+        <p:spPr>
+          <a:xfrm>
+            <a:off x="1881158" y="357166"/>
+            <a:ext cx="8229600" cy="631844"/>
+          </a:xfrm>
+        </p:spPr>
+        <p:txBody>
+          <a:bodyPr>
+            <a:normAutofit fontScale="90000"/>
+          </a:bodyPr>
+          <a:lstStyle/>
+          <a:p>
+            <a:r>
+              <a:rPr lang="fr-FR" sz="4000" dirty="0"/>
+              <a:t>Algorithme de </a:t>
+            </a:r>
+            <a:r>
+              <a:rPr lang="fr-FR" sz="4000" dirty="0" err="1"/>
+              <a:t>Zambretti</a:t>
+            </a:r>
+            <a:endParaRPr lang="fr-FR" sz="4000" dirty="0"/>
+          </a:p>
+        </p:txBody>
+      </p:sp>
+      <p:sp>
+        <p:nvSpPr>
+          <p:cNvPr id="7" name="Flèche vers le bas 6"/>
+          <p:cNvSpPr/>
+          <p:nvPr/>
+        </p:nvSpPr>
+        <p:spPr>
+          <a:xfrm rot="3640838">
+            <a:off x="5606968" y="1129536"/>
+            <a:ext cx="279094" cy="2054595"/>
+          </a:xfrm>
+          <a:prstGeom prst="downArrow">
+            <a:avLst/>
+          </a:prstGeom>
+          <a:solidFill>
+            <a:schemeClr val="accent2"/>
+          </a:solidFill>
+        </p:spPr>
+        <p:style>
+          <a:lnRef idx="2">
+            <a:schemeClr val="accent1">
+              <a:shade val="50000"/>
+            </a:schemeClr>
+          </a:lnRef>
+          <a:fillRef idx="1">
+            <a:schemeClr val="accent1"/>
+          </a:fillRef>
+          <a:effectRef idx="0">
+            <a:schemeClr val="accent1"/>
+          </a:effectRef>
+          <a:fontRef idx="minor">
+            <a:schemeClr val="lt1"/>
+          </a:fontRef>
+        </p:style>
+        <p:txBody>
+          <a:bodyPr rtlCol="0" anchor="ctr"/>
+          <a:lstStyle/>
+          <a:p>
+            <a:pPr algn="ctr"/>
+            <a:endParaRPr lang="fr-FR"/>
+          </a:p>
+        </p:txBody>
+      </p:sp>
+      <p:sp>
+        <p:nvSpPr>
+          <p:cNvPr id="8" name="Flèche vers le bas 7"/>
+          <p:cNvSpPr/>
+          <p:nvPr/>
+        </p:nvSpPr>
+        <p:spPr>
+          <a:xfrm rot="4933272">
+            <a:off x="5967497" y="1563846"/>
+            <a:ext cx="279094" cy="2606116"/>
+          </a:xfrm>
+          <a:prstGeom prst="downArrow">
+            <a:avLst/>
+          </a:prstGeom>
+          <a:solidFill>
+            <a:schemeClr val="accent2"/>
+          </a:solidFill>
+        </p:spPr>
+        <p:style>
+          <a:lnRef idx="2">
+            <a:schemeClr val="accent1">
+              <a:shade val="50000"/>
+            </a:schemeClr>
+          </a:lnRef>
+          <a:fillRef idx="1">
+            <a:schemeClr val="accent1"/>
+          </a:fillRef>
+          <a:effectRef idx="0">
+            <a:schemeClr val="accent1"/>
+          </a:effectRef>
+          <a:fontRef idx="minor">
+            <a:schemeClr val="lt1"/>
+          </a:fontRef>
+        </p:style>
+        <p:txBody>
+          <a:bodyPr rtlCol="0" anchor="ctr"/>
+          <a:lstStyle/>
+          <a:p>
+            <a:pPr algn="ctr"/>
+            <a:endParaRPr lang="fr-FR"/>
+          </a:p>
+        </p:txBody>
+      </p:sp>
+      <p:sp>
+        <p:nvSpPr>
+          <p:cNvPr id="9" name="ZoneTexte 8"/>
+          <p:cNvSpPr txBox="1"/>
+          <p:nvPr/>
+        </p:nvSpPr>
+        <p:spPr>
+          <a:xfrm>
+            <a:off x="6667504" y="1428736"/>
+            <a:ext cx="1807546" cy="369332"/>
+          </a:xfrm>
+          <a:prstGeom prst="rect">
+            <a:avLst/>
+          </a:prstGeom>
+          <a:noFill/>
+        </p:spPr>
+        <p:txBody>
+          <a:bodyPr wrap="none" rtlCol="0">
+            <a:spAutoFit/>
+          </a:bodyPr>
+          <a:lstStyle/>
+          <a:p>
+            <a:r>
+              <a:rPr lang="fr-FR" dirty="0"/>
+              <a:t>Direction du vent</a:t>
+            </a:r>
+          </a:p>
+        </p:txBody>
+      </p:sp>
+      <p:sp>
+        <p:nvSpPr>
+          <p:cNvPr id="10" name="ZoneTexte 9"/>
+          <p:cNvSpPr txBox="1"/>
+          <p:nvPr/>
+        </p:nvSpPr>
+        <p:spPr>
+          <a:xfrm>
+            <a:off x="7381885" y="2500306"/>
+            <a:ext cx="2874057" cy="369332"/>
+          </a:xfrm>
+          <a:prstGeom prst="rect">
+            <a:avLst/>
+          </a:prstGeom>
+          <a:noFill/>
+        </p:spPr>
+        <p:txBody>
+          <a:bodyPr wrap="none" rtlCol="0">
+            <a:spAutoFit/>
+          </a:bodyPr>
+          <a:lstStyle/>
+          <a:p>
+            <a:r>
+              <a:rPr lang="fr-FR" dirty="0"/>
+              <a:t>Pression au niveau de la mer</a:t>
+            </a:r>
+          </a:p>
+        </p:txBody>
+      </p:sp>
+      <p:sp>
+        <p:nvSpPr>
+          <p:cNvPr id="12" name="Flèche vers le bas 11"/>
+          <p:cNvSpPr/>
+          <p:nvPr/>
+        </p:nvSpPr>
+        <p:spPr>
+          <a:xfrm rot="11452063">
+            <a:off x="2954305" y="3334631"/>
+            <a:ext cx="279094" cy="2031736"/>
+          </a:xfrm>
+          <a:prstGeom prst="downArrow">
+            <a:avLst/>
+          </a:prstGeom>
+          <a:solidFill>
+            <a:schemeClr val="accent2"/>
+          </a:solidFill>
+        </p:spPr>
+        <p:style>
+          <a:lnRef idx="2">
+            <a:schemeClr val="accent1">
+              <a:shade val="50000"/>
+            </a:schemeClr>
+          </a:lnRef>
+          <a:fillRef idx="1">
+            <a:schemeClr val="accent1"/>
+          </a:fillRef>
+          <a:effectRef idx="0">
+            <a:schemeClr val="accent1"/>
+          </a:effectRef>
+          <a:fontRef idx="minor">
+            <a:schemeClr val="lt1"/>
+          </a:fontRef>
+        </p:style>
+        <p:txBody>
+          <a:bodyPr rtlCol="0" anchor="ctr"/>
+          <a:lstStyle/>
+          <a:p>
+            <a:pPr algn="ctr"/>
+            <a:endParaRPr lang="fr-FR"/>
+          </a:p>
+        </p:txBody>
+      </p:sp>
+      <p:sp>
+        <p:nvSpPr>
+          <p:cNvPr id="13" name="Flèche vers le bas 12"/>
+          <p:cNvSpPr/>
+          <p:nvPr/>
+        </p:nvSpPr>
+        <p:spPr>
+          <a:xfrm rot="11856606">
+            <a:off x="3449764" y="3717956"/>
+            <a:ext cx="279094" cy="1664947"/>
+          </a:xfrm>
+          <a:prstGeom prst="downArrow">
+            <a:avLst/>
+          </a:prstGeom>
+          <a:solidFill>
+            <a:schemeClr val="accent2"/>
+          </a:solidFill>
+        </p:spPr>
+        <p:style>
+          <a:lnRef idx="2">
+            <a:schemeClr val="accent1">
+              <a:shade val="50000"/>
+            </a:schemeClr>
+          </a:lnRef>
+          <a:fillRef idx="1">
+            <a:schemeClr val="accent1"/>
+          </a:fillRef>
+          <a:effectRef idx="0">
+            <a:schemeClr val="accent1"/>
+          </a:effectRef>
+          <a:fontRef idx="minor">
+            <a:schemeClr val="lt1"/>
+          </a:fontRef>
+        </p:style>
+        <p:txBody>
+          <a:bodyPr rtlCol="0" anchor="ctr"/>
+          <a:lstStyle/>
+          <a:p>
+            <a:pPr algn="ctr"/>
+            <a:endParaRPr lang="fr-FR"/>
+          </a:p>
+        </p:txBody>
+      </p:sp>
+      <p:sp>
+        <p:nvSpPr>
+          <p:cNvPr id="14" name="ZoneTexte 13"/>
+          <p:cNvSpPr txBox="1"/>
+          <p:nvPr/>
+        </p:nvSpPr>
+        <p:spPr>
+          <a:xfrm>
+            <a:off x="1738282" y="5357827"/>
+            <a:ext cx="3143272" cy="1200329"/>
+          </a:xfrm>
+          <a:prstGeom prst="rect">
+            <a:avLst/>
+          </a:prstGeom>
+          <a:noFill/>
+        </p:spPr>
+        <p:txBody>
+          <a:bodyPr wrap="square" rtlCol="0">
+            <a:spAutoFit/>
+          </a:bodyPr>
+          <a:lstStyle/>
+          <a:p>
+            <a:pPr algn="ctr"/>
+            <a:r>
+              <a:rPr lang="fr-FR" dirty="0"/>
+              <a:t>Lecture:</a:t>
+            </a:r>
+          </a:p>
+          <a:p>
+            <a:pPr algn="ctr"/>
+            <a:r>
+              <a:rPr lang="fr-FR" dirty="0"/>
+              <a:t>Lettre de l’alphabet</a:t>
+            </a:r>
+          </a:p>
+          <a:p>
+            <a:pPr algn="ctr"/>
+            <a:r>
+              <a:rPr lang="fr-FR" i="1" dirty="0"/>
+              <a:t>Fonction de la tendance</a:t>
+            </a:r>
+          </a:p>
+          <a:p>
+            <a:pPr algn="ctr"/>
+            <a:r>
+              <a:rPr lang="fr-FR" i="1" dirty="0"/>
+              <a:t>de pression</a:t>
+            </a:r>
+          </a:p>
+        </p:txBody>
+      </p:sp>
+      <p:sp>
+        <p:nvSpPr>
+          <p:cNvPr id="15" name="Flèche vers le bas 14"/>
+          <p:cNvSpPr/>
+          <p:nvPr/>
+        </p:nvSpPr>
+        <p:spPr>
+          <a:xfrm rot="12170335">
+            <a:off x="3964614" y="3369517"/>
+            <a:ext cx="279094" cy="2054886"/>
+          </a:xfrm>
+          <a:prstGeom prst="downArrow">
+            <a:avLst/>
+          </a:prstGeom>
+          <a:solidFill>
+            <a:schemeClr val="accent2"/>
+          </a:solidFill>
+        </p:spPr>
+        <p:style>
+          <a:lnRef idx="2">
+            <a:schemeClr val="accent1">
+              <a:shade val="50000"/>
+            </a:schemeClr>
+          </a:lnRef>
+          <a:fillRef idx="1">
+            <a:schemeClr val="accent1"/>
+          </a:fillRef>
+          <a:effectRef idx="0">
+            <a:schemeClr val="accent1"/>
+          </a:effectRef>
+          <a:fontRef idx="minor">
+            <a:schemeClr val="lt1"/>
+          </a:fontRef>
+        </p:style>
+        <p:txBody>
+          <a:bodyPr rtlCol="0" anchor="ctr"/>
+          <a:lstStyle/>
+          <a:p>
+            <a:pPr algn="ctr"/>
+            <a:endParaRPr lang="fr-FR"/>
+          </a:p>
+        </p:txBody>
+      </p:sp>
+      <p:sp>
+        <p:nvSpPr>
+          <p:cNvPr id="16" name="Flèche vers le bas 15"/>
+          <p:cNvSpPr/>
+          <p:nvPr/>
+        </p:nvSpPr>
+        <p:spPr>
+          <a:xfrm rot="14204621">
+            <a:off x="5942702" y="3835955"/>
+            <a:ext cx="285752" cy="2783303"/>
+          </a:xfrm>
+          <a:prstGeom prst="downArrow">
+            <a:avLst/>
+          </a:prstGeom>
+        </p:spPr>
+        <p:style>
+          <a:lnRef idx="2">
+            <a:schemeClr val="accent1">
+              <a:shade val="50000"/>
+            </a:schemeClr>
+          </a:lnRef>
+          <a:fillRef idx="1">
+            <a:schemeClr val="accent1"/>
+          </a:fillRef>
+          <a:effectRef idx="0">
+            <a:schemeClr val="accent1"/>
+          </a:effectRef>
+          <a:fontRef idx="minor">
+            <a:schemeClr val="lt1"/>
+          </a:fontRef>
+        </p:style>
+        <p:txBody>
+          <a:bodyPr rtlCol="0" anchor="ctr"/>
+          <a:lstStyle/>
+          <a:p>
+            <a:pPr algn="ctr"/>
+            <a:endParaRPr lang="fr-FR"/>
+          </a:p>
+        </p:txBody>
+      </p:sp>
+      <p:sp>
+        <p:nvSpPr>
+          <p:cNvPr id="17" name="ZoneTexte 16"/>
+          <p:cNvSpPr txBox="1"/>
+          <p:nvPr/>
+        </p:nvSpPr>
+        <p:spPr>
+          <a:xfrm>
+            <a:off x="5524497" y="5640190"/>
+            <a:ext cx="1792029" cy="646331"/>
+          </a:xfrm>
+          <a:prstGeom prst="rect">
+            <a:avLst/>
+          </a:prstGeom>
+          <a:noFill/>
+        </p:spPr>
+        <p:txBody>
+          <a:bodyPr wrap="none" rtlCol="0">
+            <a:spAutoFit/>
+          </a:bodyPr>
+          <a:lstStyle/>
+          <a:p>
+            <a:r>
+              <a:rPr lang="fr-FR" dirty="0"/>
+              <a:t>Correspondance</a:t>
+            </a:r>
+          </a:p>
+          <a:p>
+            <a:r>
+              <a:rPr lang="fr-FR" dirty="0"/>
+              <a:t>Lettre / prévision</a:t>
+            </a:r>
           </a:p>
         </p:txBody>
       </p:sp>
     </p:spTree>
-    <p:extLst>
-      <p:ext uri="{BB962C8B-B14F-4D97-AF65-F5344CB8AC3E}">
-        <p14:creationId xmlns:p14="http://schemas.microsoft.com/office/powerpoint/2010/main" val="728810438"/>
-      </p:ext>
-    </p:extLst>
   </p:cSld>
   <p:clrMapOvr>
     <a:masterClrMapping/>
@@ -4294,13 +4792,7 @@
       </p:grpSpPr>
       <p:sp>
         <p:nvSpPr>
-          <p:cNvPr id="2" name="Titre 1">
-            <a:extLst>
-              <a:ext uri="{FF2B5EF4-FFF2-40B4-BE49-F238E27FC236}">
-                <a16:creationId xmlns:a16="http://schemas.microsoft.com/office/drawing/2014/main" id="{C7BE326B-715B-4426-BD4C-06E41100F853}"/>
-              </a:ext>
-            </a:extLst>
-          </p:cNvPr>
+          <p:cNvPr id="4" name="Titre 3"/>
           <p:cNvSpPr>
             <a:spLocks noGrp="1"/>
           </p:cNvSpPr>
@@ -4308,128 +4800,1043 @@
             <p:ph type="title"/>
           </p:nvPr>
         </p:nvSpPr>
-        <p:spPr/>
-        <p:txBody>
-          <a:bodyPr/>
-          <a:lstStyle/>
-          <a:p>
-            <a:r>
-              <a:rPr lang="fr-FR" dirty="0"/>
-              <a:t>Conclusions</a:t>
-            </a:r>
-            <a:endParaRPr lang="en-US" dirty="0"/>
-          </a:p>
-        </p:txBody>
-      </p:sp>
-      <p:sp>
-        <p:nvSpPr>
-          <p:cNvPr id="3" name="Espace réservé du contenu 2">
-            <a:extLst>
-              <a:ext uri="{FF2B5EF4-FFF2-40B4-BE49-F238E27FC236}">
-                <a16:creationId xmlns:a16="http://schemas.microsoft.com/office/drawing/2014/main" id="{C8EC75DF-2FB2-4388-B226-AD8772E82D5C}"/>
-              </a:ext>
-            </a:extLst>
-          </p:cNvPr>
-          <p:cNvSpPr>
-            <a:spLocks noGrp="1"/>
-          </p:cNvSpPr>
-          <p:nvPr>
-            <p:ph idx="1"/>
-          </p:nvPr>
-        </p:nvSpPr>
-        <p:spPr/>
-        <p:txBody>
-          <a:bodyPr/>
-          <a:lstStyle/>
-          <a:p>
-            <a:r>
-              <a:rPr lang="fr-FR" dirty="0"/>
-              <a:t>Développement efficace:</a:t>
-            </a:r>
-          </a:p>
-          <a:p>
-            <a:pPr lvl="1"/>
-            <a:r>
-              <a:rPr lang="fr-FR" dirty="0"/>
-              <a:t>Prévoyance des contraintes.</a:t>
-            </a:r>
-          </a:p>
-          <a:p>
-            <a:pPr lvl="1"/>
-            <a:r>
-              <a:rPr lang="fr-FR" dirty="0"/>
-              <a:t>Adaptation par le suivit quotidien de l’avance du projet.</a:t>
-            </a:r>
-          </a:p>
-          <a:p>
-            <a:pPr lvl="1"/>
-            <a:r>
-              <a:rPr lang="fr-FR" dirty="0"/>
-              <a:t>Production d’un livrable.</a:t>
-            </a:r>
-          </a:p>
-          <a:p>
-            <a:pPr lvl="1"/>
+        <p:spPr>
+          <a:xfrm>
+            <a:off x="1881158" y="357166"/>
+            <a:ext cx="8229600" cy="631844"/>
+          </a:xfrm>
+        </p:spPr>
+        <p:txBody>
+          <a:bodyPr>
+            <a:normAutofit fontScale="90000"/>
+          </a:bodyPr>
+          <a:lstStyle/>
+          <a:p>
+            <a:r>
+              <a:rPr lang="fr-FR" sz="4000" dirty="0"/>
+              <a:t>Algorithme de </a:t>
+            </a:r>
+            <a:r>
+              <a:rPr lang="fr-FR" sz="4000" dirty="0" err="1"/>
+              <a:t>Zambretti</a:t>
+            </a:r>
+            <a:r>
+              <a:rPr lang="fr-FR" sz="4000" dirty="0"/>
+              <a:t> implémenté</a:t>
+            </a:r>
+          </a:p>
+        </p:txBody>
+      </p:sp>
+      <p:sp>
+        <p:nvSpPr>
+          <p:cNvPr id="8" name="Rectangle à coins arrondis 7"/>
+          <p:cNvSpPr/>
+          <p:nvPr/>
+        </p:nvSpPr>
+        <p:spPr>
+          <a:xfrm>
+            <a:off x="2024034" y="2714620"/>
+            <a:ext cx="1571636" cy="928694"/>
+          </a:xfrm>
+          <a:prstGeom prst="roundRect">
+            <a:avLst/>
+          </a:prstGeom>
+          <a:noFill/>
+          <a:ln w="41275">
+            <a:solidFill>
+              <a:schemeClr val="accent2">
+                <a:lumMod val="75000"/>
+              </a:schemeClr>
+            </a:solidFill>
+          </a:ln>
+        </p:spPr>
+        <p:style>
+          <a:lnRef idx="2">
+            <a:schemeClr val="accent1">
+              <a:shade val="50000"/>
+            </a:schemeClr>
+          </a:lnRef>
+          <a:fillRef idx="1">
+            <a:schemeClr val="accent1"/>
+          </a:fillRef>
+          <a:effectRef idx="0">
+            <a:schemeClr val="accent1"/>
+          </a:effectRef>
+          <a:fontRef idx="minor">
+            <a:schemeClr val="lt1"/>
+          </a:fontRef>
+        </p:style>
+        <p:txBody>
+          <a:bodyPr rtlCol="0" anchor="ctr"/>
+          <a:lstStyle/>
+          <a:p>
+            <a:pPr algn="ctr"/>
+            <a:r>
+              <a:rPr lang="fr-FR" sz="2400" dirty="0" err="1">
+                <a:solidFill>
+                  <a:schemeClr val="tx1"/>
+                </a:solidFill>
+              </a:rPr>
+              <a:t>dP</a:t>
+            </a:r>
+            <a:r>
+              <a:rPr lang="fr-FR" sz="2400" dirty="0">
+                <a:solidFill>
+                  <a:schemeClr val="tx1"/>
+                </a:solidFill>
+              </a:rPr>
+              <a:t>/</a:t>
+            </a:r>
+            <a:r>
+              <a:rPr lang="fr-FR" sz="2400" dirty="0" err="1">
+                <a:solidFill>
+                  <a:schemeClr val="tx1"/>
+                </a:solidFill>
+              </a:rPr>
+              <a:t>dt</a:t>
+            </a:r>
+            <a:endParaRPr lang="fr-FR" sz="2400" dirty="0">
+              <a:solidFill>
+                <a:schemeClr val="tx1"/>
+              </a:solidFill>
+            </a:endParaRPr>
+          </a:p>
+        </p:txBody>
+      </p:sp>
+      <p:sp>
+        <p:nvSpPr>
+          <p:cNvPr id="9" name="Rectangle à coins arrondis 8"/>
+          <p:cNvSpPr/>
+          <p:nvPr/>
+        </p:nvSpPr>
+        <p:spPr>
+          <a:xfrm>
+            <a:off x="6810380" y="1714488"/>
+            <a:ext cx="1143008" cy="714380"/>
+          </a:xfrm>
+          <a:prstGeom prst="roundRect">
+            <a:avLst/>
+          </a:prstGeom>
+          <a:noFill/>
+          <a:ln w="41275">
+            <a:solidFill>
+              <a:schemeClr val="accent2">
+                <a:lumMod val="75000"/>
+              </a:schemeClr>
+            </a:solidFill>
+          </a:ln>
+        </p:spPr>
+        <p:style>
+          <a:lnRef idx="2">
+            <a:schemeClr val="accent1">
+              <a:shade val="50000"/>
+            </a:schemeClr>
+          </a:lnRef>
+          <a:fillRef idx="1">
+            <a:schemeClr val="accent1"/>
+          </a:fillRef>
+          <a:effectRef idx="0">
+            <a:schemeClr val="accent1"/>
+          </a:effectRef>
+          <a:fontRef idx="minor">
+            <a:schemeClr val="lt1"/>
+          </a:fontRef>
+        </p:style>
+        <p:txBody>
+          <a:bodyPr rtlCol="0" anchor="ctr"/>
+          <a:lstStyle/>
+          <a:p>
+            <a:pPr algn="ctr"/>
+            <a:r>
+              <a:rPr lang="fr-FR" sz="2400" dirty="0">
+                <a:solidFill>
+                  <a:schemeClr val="tx1"/>
+                </a:solidFill>
+              </a:rPr>
+              <a:t>P (Pa)</a:t>
+            </a:r>
+          </a:p>
+        </p:txBody>
+      </p:sp>
+      <p:sp>
+        <p:nvSpPr>
+          <p:cNvPr id="10" name="Flèche droite 9"/>
+          <p:cNvSpPr/>
+          <p:nvPr/>
+        </p:nvSpPr>
+        <p:spPr>
+          <a:xfrm>
+            <a:off x="3809984" y="3143248"/>
+            <a:ext cx="642942" cy="142876"/>
+          </a:xfrm>
+          <a:prstGeom prst="rightArrow">
+            <a:avLst/>
+          </a:prstGeom>
+        </p:spPr>
+        <p:style>
+          <a:lnRef idx="2">
+            <a:schemeClr val="accent1">
+              <a:shade val="50000"/>
+            </a:schemeClr>
+          </a:lnRef>
+          <a:fillRef idx="1">
+            <a:schemeClr val="accent1"/>
+          </a:fillRef>
+          <a:effectRef idx="0">
+            <a:schemeClr val="accent1"/>
+          </a:effectRef>
+          <a:fontRef idx="minor">
+            <a:schemeClr val="lt1"/>
+          </a:fontRef>
+        </p:style>
+        <p:txBody>
+          <a:bodyPr rtlCol="0" anchor="ctr"/>
+          <a:lstStyle/>
+          <a:p>
+            <a:pPr algn="ctr"/>
+            <a:endParaRPr lang="fr-FR"/>
+          </a:p>
+        </p:txBody>
+      </p:sp>
+      <p:sp>
+        <p:nvSpPr>
+          <p:cNvPr id="12" name="Rectangle à coins arrondis 11"/>
+          <p:cNvSpPr/>
+          <p:nvPr/>
+        </p:nvSpPr>
+        <p:spPr>
+          <a:xfrm>
+            <a:off x="4738678" y="2714620"/>
+            <a:ext cx="1571636" cy="928694"/>
+          </a:xfrm>
+          <a:prstGeom prst="roundRect">
+            <a:avLst/>
+          </a:prstGeom>
+          <a:noFill/>
+          <a:ln w="41275">
+            <a:solidFill>
+              <a:schemeClr val="accent2">
+                <a:lumMod val="75000"/>
+              </a:schemeClr>
+            </a:solidFill>
+          </a:ln>
+        </p:spPr>
+        <p:style>
+          <a:lnRef idx="2">
+            <a:schemeClr val="accent1">
+              <a:shade val="50000"/>
+            </a:schemeClr>
+          </a:lnRef>
+          <a:fillRef idx="1">
+            <a:schemeClr val="accent1"/>
+          </a:fillRef>
+          <a:effectRef idx="0">
+            <a:schemeClr val="accent1"/>
+          </a:effectRef>
+          <a:fontRef idx="minor">
+            <a:schemeClr val="lt1"/>
+          </a:fontRef>
+        </p:style>
+        <p:txBody>
+          <a:bodyPr rtlCol="0" anchor="ctr"/>
+          <a:lstStyle/>
+          <a:p>
+            <a:pPr algn="ctr"/>
+            <a:r>
+              <a:rPr lang="fr-FR" sz="2400" dirty="0">
+                <a:solidFill>
+                  <a:schemeClr val="tx1"/>
+                </a:solidFill>
+              </a:rPr>
+              <a:t>Choix</a:t>
+            </a:r>
+          </a:p>
+          <a:p>
+            <a:pPr algn="ctr"/>
+            <a:r>
+              <a:rPr lang="fr-FR" sz="2400" dirty="0">
+                <a:solidFill>
+                  <a:schemeClr val="tx1"/>
+                </a:solidFill>
+              </a:rPr>
+              <a:t>Equation</a:t>
+            </a:r>
+          </a:p>
+        </p:txBody>
+      </p:sp>
+      <p:sp>
+        <p:nvSpPr>
+          <p:cNvPr id="13" name="Rectangle à coins arrondis 12"/>
+          <p:cNvSpPr/>
+          <p:nvPr/>
+        </p:nvSpPr>
+        <p:spPr>
+          <a:xfrm>
+            <a:off x="8310578" y="2714620"/>
+            <a:ext cx="1571636" cy="928694"/>
+          </a:xfrm>
+          <a:prstGeom prst="roundRect">
+            <a:avLst/>
+          </a:prstGeom>
+          <a:noFill/>
+          <a:ln w="41275">
+            <a:solidFill>
+              <a:schemeClr val="accent2">
+                <a:lumMod val="75000"/>
+              </a:schemeClr>
+            </a:solidFill>
+          </a:ln>
+        </p:spPr>
+        <p:style>
+          <a:lnRef idx="2">
+            <a:schemeClr val="accent1">
+              <a:shade val="50000"/>
+            </a:schemeClr>
+          </a:lnRef>
+          <a:fillRef idx="1">
+            <a:schemeClr val="accent1"/>
+          </a:fillRef>
+          <a:effectRef idx="0">
+            <a:schemeClr val="accent1"/>
+          </a:effectRef>
+          <a:fontRef idx="minor">
+            <a:schemeClr val="lt1"/>
+          </a:fontRef>
+        </p:style>
+        <p:txBody>
+          <a:bodyPr rtlCol="0" anchor="ctr"/>
+          <a:lstStyle/>
+          <a:p>
+            <a:pPr algn="ctr"/>
+            <a:r>
+              <a:rPr lang="fr-FR" sz="2400" dirty="0">
+                <a:solidFill>
+                  <a:schemeClr val="tx1"/>
+                </a:solidFill>
+              </a:rPr>
+              <a:t>Nombre</a:t>
+            </a:r>
+          </a:p>
+          <a:p>
+            <a:pPr algn="ctr"/>
+            <a:r>
+              <a:rPr lang="fr-FR" sz="2400" dirty="0" err="1">
+                <a:solidFill>
+                  <a:schemeClr val="tx1"/>
+                </a:solidFill>
+              </a:rPr>
+              <a:t>Zambretti</a:t>
+            </a:r>
+            <a:endParaRPr lang="fr-FR" sz="2400" dirty="0">
+              <a:solidFill>
+                <a:schemeClr val="tx1"/>
+              </a:solidFill>
+            </a:endParaRPr>
+          </a:p>
+        </p:txBody>
+      </p:sp>
+      <p:sp>
+        <p:nvSpPr>
+          <p:cNvPr id="16" name="Flèche droite 15"/>
+          <p:cNvSpPr/>
+          <p:nvPr/>
+        </p:nvSpPr>
+        <p:spPr>
+          <a:xfrm>
+            <a:off x="6453190" y="3071810"/>
+            <a:ext cx="1714512" cy="142876"/>
+          </a:xfrm>
+          <a:prstGeom prst="rightArrow">
+            <a:avLst/>
+          </a:prstGeom>
+        </p:spPr>
+        <p:style>
+          <a:lnRef idx="2">
+            <a:schemeClr val="accent1">
+              <a:shade val="50000"/>
+            </a:schemeClr>
+          </a:lnRef>
+          <a:fillRef idx="1">
+            <a:schemeClr val="accent1"/>
+          </a:fillRef>
+          <a:effectRef idx="0">
+            <a:schemeClr val="accent1"/>
+          </a:effectRef>
+          <a:fontRef idx="minor">
+            <a:schemeClr val="lt1"/>
+          </a:fontRef>
+        </p:style>
+        <p:txBody>
+          <a:bodyPr rtlCol="0" anchor="ctr"/>
+          <a:lstStyle/>
+          <a:p>
+            <a:pPr algn="ctr"/>
+            <a:endParaRPr lang="fr-FR"/>
+          </a:p>
+        </p:txBody>
+      </p:sp>
+      <p:sp>
+        <p:nvSpPr>
+          <p:cNvPr id="17" name="Flèche droite 16"/>
+          <p:cNvSpPr/>
+          <p:nvPr/>
+        </p:nvSpPr>
+        <p:spPr>
+          <a:xfrm rot="5400000">
+            <a:off x="7203289" y="2750339"/>
+            <a:ext cx="357190" cy="142876"/>
+          </a:xfrm>
+          <a:prstGeom prst="rightArrow">
+            <a:avLst/>
+          </a:prstGeom>
+        </p:spPr>
+        <p:style>
+          <a:lnRef idx="2">
+            <a:schemeClr val="accent1">
+              <a:shade val="50000"/>
+            </a:schemeClr>
+          </a:lnRef>
+          <a:fillRef idx="1">
+            <a:schemeClr val="accent1"/>
+          </a:fillRef>
+          <a:effectRef idx="0">
+            <a:schemeClr val="accent1"/>
+          </a:effectRef>
+          <a:fontRef idx="minor">
+            <a:schemeClr val="lt1"/>
+          </a:fontRef>
+        </p:style>
+        <p:txBody>
+          <a:bodyPr rtlCol="0" anchor="ctr"/>
+          <a:lstStyle/>
+          <a:p>
+            <a:pPr algn="ctr"/>
+            <a:endParaRPr lang="fr-FR"/>
+          </a:p>
+        </p:txBody>
+      </p:sp>
+      <p:sp>
+        <p:nvSpPr>
+          <p:cNvPr id="18" name="ZoneTexte 17"/>
+          <p:cNvSpPr txBox="1"/>
+          <p:nvPr/>
+        </p:nvSpPr>
+        <p:spPr>
+          <a:xfrm>
+            <a:off x="2309786" y="1996852"/>
+            <a:ext cx="1071570" cy="646331"/>
+          </a:xfrm>
+          <a:prstGeom prst="rect">
+            <a:avLst/>
+          </a:prstGeom>
+          <a:noFill/>
+        </p:spPr>
+        <p:txBody>
+          <a:bodyPr wrap="square" rtlCol="0">
+            <a:spAutoFit/>
+          </a:bodyPr>
+          <a:lstStyle/>
+          <a:p>
+            <a:pPr algn="ctr"/>
+            <a:r>
+              <a:rPr lang="fr-FR" dirty="0"/>
+              <a:t>Echelle: </a:t>
+            </a:r>
+          </a:p>
+          <a:p>
+            <a:pPr algn="ctr"/>
+            <a:r>
+              <a:rPr lang="fr-FR" dirty="0"/>
+              <a:t>heure</a:t>
+            </a:r>
+          </a:p>
+        </p:txBody>
+      </p:sp>
+      <p:sp>
+        <p:nvSpPr>
+          <p:cNvPr id="20" name="ZoneTexte 19"/>
+          <p:cNvSpPr txBox="1"/>
+          <p:nvPr/>
+        </p:nvSpPr>
+        <p:spPr>
+          <a:xfrm>
+            <a:off x="4738678" y="1285860"/>
+            <a:ext cx="1500198" cy="1338828"/>
+          </a:xfrm>
+          <a:prstGeom prst="rect">
+            <a:avLst/>
+          </a:prstGeom>
+          <a:noFill/>
+        </p:spPr>
+        <p:txBody>
+          <a:bodyPr wrap="square" rtlCol="0">
+            <a:spAutoFit/>
+          </a:bodyPr>
+          <a:lstStyle/>
+          <a:p>
+            <a:pPr>
+              <a:lnSpc>
+                <a:spcPct val="150000"/>
+              </a:lnSpc>
+            </a:pPr>
+            <a:r>
+              <a:rPr lang="fr-FR" dirty="0"/>
+              <a:t>1. </a:t>
+            </a:r>
+            <a:r>
+              <a:rPr lang="fr-FR" dirty="0" err="1"/>
+              <a:t>dP</a:t>
+            </a:r>
+            <a:r>
+              <a:rPr lang="fr-FR" dirty="0"/>
+              <a:t>/</a:t>
+            </a:r>
+            <a:r>
+              <a:rPr lang="fr-FR" dirty="0" err="1"/>
+              <a:t>dt</a:t>
+            </a:r>
             <a:endParaRPr lang="fr-FR" dirty="0"/>
           </a:p>
           <a:p>
-            <a:r>
-              <a:rPr lang="fr-FR" dirty="0"/>
-              <a:t>Prototype valide par des tests.</a:t>
-            </a:r>
-          </a:p>
-          <a:p>
-            <a:r>
-              <a:rPr lang="fr-FR" dirty="0"/>
-              <a:t>Facilite de déploiement.</a:t>
-            </a:r>
-          </a:p>
-          <a:p>
+            <a:pPr>
+              <a:lnSpc>
+                <a:spcPct val="150000"/>
+              </a:lnSpc>
+            </a:pPr>
+            <a:r>
+              <a:rPr lang="fr-FR" dirty="0"/>
+              <a:t>2. </a:t>
+            </a:r>
+            <a:r>
+              <a:rPr lang="fr-FR" dirty="0" err="1"/>
+              <a:t>dP</a:t>
+            </a:r>
+            <a:r>
+              <a:rPr lang="fr-FR" dirty="0"/>
+              <a:t>/</a:t>
+            </a:r>
+            <a:r>
+              <a:rPr lang="fr-FR" dirty="0" err="1"/>
+              <a:t>dt</a:t>
+            </a:r>
             <a:endParaRPr lang="fr-FR" dirty="0"/>
           </a:p>
           <a:p>
+            <a:pPr>
+              <a:lnSpc>
+                <a:spcPct val="150000"/>
+              </a:lnSpc>
+            </a:pPr>
+            <a:r>
+              <a:rPr lang="fr-FR" dirty="0"/>
+              <a:t>3. </a:t>
+            </a:r>
+            <a:r>
+              <a:rPr lang="fr-FR" dirty="0" err="1"/>
+              <a:t>dP</a:t>
+            </a:r>
+            <a:r>
+              <a:rPr lang="fr-FR" dirty="0"/>
+              <a:t>/</a:t>
+            </a:r>
+            <a:r>
+              <a:rPr lang="fr-FR" dirty="0" err="1"/>
+              <a:t>dt</a:t>
+            </a:r>
+            <a:r>
+              <a:rPr lang="fr-FR" dirty="0"/>
+              <a:t> </a:t>
+            </a:r>
+          </a:p>
+        </p:txBody>
+      </p:sp>
+      <p:cxnSp>
+        <p:nvCxnSpPr>
+          <p:cNvPr id="22" name="Connecteur droit avec flèche 21"/>
+          <p:cNvCxnSpPr/>
+          <p:nvPr/>
+        </p:nvCxnSpPr>
+        <p:spPr>
+          <a:xfrm rot="5400000" flipH="1" flipV="1">
+            <a:off x="5625581" y="1399087"/>
+            <a:ext cx="297894" cy="214316"/>
+          </a:xfrm>
+          <a:prstGeom prst="straightConnector1">
+            <a:avLst/>
+          </a:prstGeom>
+          <a:ln w="25400">
+            <a:solidFill>
+              <a:schemeClr val="tx1"/>
+            </a:solidFill>
+            <a:tailEnd type="arrow"/>
+          </a:ln>
+        </p:spPr>
+        <p:style>
+          <a:lnRef idx="1">
+            <a:schemeClr val="accent1"/>
+          </a:lnRef>
+          <a:fillRef idx="0">
+            <a:schemeClr val="accent1"/>
+          </a:fillRef>
+          <a:effectRef idx="0">
+            <a:schemeClr val="accent1"/>
+          </a:effectRef>
+          <a:fontRef idx="minor">
+            <a:schemeClr val="tx1"/>
+          </a:fontRef>
+        </p:style>
+      </p:cxnSp>
+      <p:cxnSp>
+        <p:nvCxnSpPr>
+          <p:cNvPr id="23" name="Connecteur droit avec flèche 22"/>
+          <p:cNvCxnSpPr/>
+          <p:nvPr/>
+        </p:nvCxnSpPr>
+        <p:spPr>
+          <a:xfrm rot="16200000" flipH="1">
+            <a:off x="5703091" y="2250274"/>
+            <a:ext cx="285752" cy="214314"/>
+          </a:xfrm>
+          <a:prstGeom prst="straightConnector1">
+            <a:avLst/>
+          </a:prstGeom>
+          <a:ln w="25400">
+            <a:solidFill>
+              <a:schemeClr val="tx1"/>
+            </a:solidFill>
+            <a:tailEnd type="arrow"/>
+          </a:ln>
+        </p:spPr>
+        <p:style>
+          <a:lnRef idx="1">
+            <a:schemeClr val="accent1"/>
+          </a:lnRef>
+          <a:fillRef idx="0">
+            <a:schemeClr val="accent1"/>
+          </a:fillRef>
+          <a:effectRef idx="0">
+            <a:schemeClr val="accent1"/>
+          </a:effectRef>
+          <a:fontRef idx="minor">
+            <a:schemeClr val="tx1"/>
+          </a:fontRef>
+        </p:style>
+      </p:cxnSp>
+      <p:cxnSp>
+        <p:nvCxnSpPr>
+          <p:cNvPr id="26" name="Connecteur droit avec flèche 25"/>
+          <p:cNvCxnSpPr/>
+          <p:nvPr/>
+        </p:nvCxnSpPr>
+        <p:spPr>
+          <a:xfrm flipV="1">
+            <a:off x="5667372" y="2000240"/>
+            <a:ext cx="357190" cy="12142"/>
+          </a:xfrm>
+          <a:prstGeom prst="straightConnector1">
+            <a:avLst/>
+          </a:prstGeom>
+          <a:ln w="25400">
+            <a:solidFill>
+              <a:schemeClr val="tx1"/>
+            </a:solidFill>
+            <a:tailEnd type="arrow"/>
+          </a:ln>
+        </p:spPr>
+        <p:style>
+          <a:lnRef idx="1">
+            <a:schemeClr val="accent1"/>
+          </a:lnRef>
+          <a:fillRef idx="0">
+            <a:schemeClr val="accent1"/>
+          </a:fillRef>
+          <a:effectRef idx="0">
+            <a:schemeClr val="accent1"/>
+          </a:effectRef>
+          <a:fontRef idx="minor">
+            <a:schemeClr val="tx1"/>
+          </a:fontRef>
+        </p:style>
+      </p:cxnSp>
+      <p:sp>
+        <p:nvSpPr>
+          <p:cNvPr id="33" name="ZoneTexte 32"/>
+          <p:cNvSpPr txBox="1"/>
+          <p:nvPr/>
+        </p:nvSpPr>
+        <p:spPr>
+          <a:xfrm>
+            <a:off x="6667504" y="1071547"/>
+            <a:ext cx="1428760" cy="646331"/>
+          </a:xfrm>
+          <a:prstGeom prst="rect">
+            <a:avLst/>
+          </a:prstGeom>
+          <a:noFill/>
+        </p:spPr>
+        <p:txBody>
+          <a:bodyPr wrap="square" rtlCol="0">
+            <a:spAutoFit/>
+          </a:bodyPr>
+          <a:lstStyle/>
+          <a:p>
+            <a:pPr algn="ctr"/>
+            <a:r>
+              <a:rPr lang="fr-FR" dirty="0"/>
+              <a:t>Moyenne:</a:t>
+            </a:r>
+          </a:p>
+          <a:p>
+            <a:pPr algn="ctr"/>
+            <a:r>
+              <a:rPr lang="fr-FR" dirty="0"/>
+              <a:t>10 s</a:t>
+            </a:r>
+          </a:p>
+        </p:txBody>
+      </p:sp>
+      <p:sp>
+        <p:nvSpPr>
+          <p:cNvPr id="34" name="ZoneTexte 33"/>
+          <p:cNvSpPr txBox="1"/>
+          <p:nvPr/>
+        </p:nvSpPr>
+        <p:spPr>
+          <a:xfrm>
+            <a:off x="1881158" y="3929067"/>
+            <a:ext cx="2000264" cy="2585323"/>
+          </a:xfrm>
+          <a:prstGeom prst="rect">
+            <a:avLst/>
+          </a:prstGeom>
+          <a:noFill/>
+        </p:spPr>
+        <p:txBody>
+          <a:bodyPr wrap="square" rtlCol="0">
+            <a:spAutoFit/>
+          </a:bodyPr>
+          <a:lstStyle/>
+          <a:p>
+            <a:r>
+              <a:rPr lang="fr-FR" dirty="0"/>
+              <a:t>Historisation:</a:t>
+            </a:r>
+          </a:p>
+          <a:p>
+            <a:pPr>
+              <a:buFont typeface="Arial" pitchFamily="34" charset="0"/>
+              <a:buChar char="•"/>
+            </a:pPr>
+            <a:r>
+              <a:rPr lang="fr-FR" dirty="0"/>
+              <a:t> Phase 1: une tendance / heure</a:t>
+            </a:r>
+          </a:p>
+          <a:p>
+            <a:pPr>
+              <a:buFont typeface="Arial" pitchFamily="34" charset="0"/>
+              <a:buChar char="•"/>
+            </a:pPr>
+            <a:r>
+              <a:rPr lang="fr-FR" dirty="0"/>
+              <a:t> Phase 2: une tendance / minute</a:t>
+            </a:r>
+          </a:p>
+          <a:p>
+            <a:pPr>
+              <a:buFont typeface="Arial" pitchFamily="34" charset="0"/>
+              <a:buChar char="•"/>
+            </a:pPr>
             <a:endParaRPr lang="fr-FR" dirty="0"/>
           </a:p>
           <a:p>
-            <a:endParaRPr lang="en-US" dirty="0"/>
-          </a:p>
-        </p:txBody>
-      </p:sp>
-      <p:sp>
-        <p:nvSpPr>
-          <p:cNvPr id="4" name="Espace réservé du numéro de diapositive 3">
-            <a:extLst>
-              <a:ext uri="{FF2B5EF4-FFF2-40B4-BE49-F238E27FC236}">
-                <a16:creationId xmlns:a16="http://schemas.microsoft.com/office/drawing/2014/main" id="{5E5734B6-7182-4A17-8C04-B19EB308B116}"/>
-              </a:ext>
-            </a:extLst>
-          </p:cNvPr>
-          <p:cNvSpPr>
-            <a:spLocks noGrp="1"/>
-          </p:cNvSpPr>
-          <p:nvPr>
-            <p:ph type="sldNum" sz="quarter" idx="12"/>
-          </p:nvPr>
-        </p:nvSpPr>
-        <p:spPr/>
-        <p:txBody>
-          <a:bodyPr/>
-          <a:lstStyle/>
-          <a:p>
-            <a:fld id="{B4C56C5B-B224-400D-A2FE-072C37A0476F}" type="slidenum">
-              <a:rPr lang="en-US" smtClean="0"/>
-              <a:t>13</a:t>
-            </a:fld>
-            <a:endParaRPr lang="en-US"/>
+            <a:pPr>
+              <a:buFont typeface="Arial" pitchFamily="34" charset="0"/>
+              <a:buChar char="•"/>
+            </a:pPr>
+            <a:r>
+              <a:rPr lang="fr-FR" dirty="0"/>
+              <a:t>Phase essai: une tendance / 10 min</a:t>
+            </a:r>
+          </a:p>
+          <a:p>
+            <a:endParaRPr lang="fr-FR" dirty="0"/>
+          </a:p>
+        </p:txBody>
+      </p:sp>
+      <p:sp>
+        <p:nvSpPr>
+          <p:cNvPr id="35" name="ZoneTexte 34"/>
+          <p:cNvSpPr txBox="1"/>
+          <p:nvPr/>
+        </p:nvSpPr>
+        <p:spPr>
+          <a:xfrm>
+            <a:off x="4452926" y="3929067"/>
+            <a:ext cx="2643206" cy="2169825"/>
+          </a:xfrm>
+          <a:prstGeom prst="rect">
+            <a:avLst/>
+          </a:prstGeom>
+          <a:noFill/>
+        </p:spPr>
+        <p:txBody>
+          <a:bodyPr wrap="square" rtlCol="0">
+            <a:spAutoFit/>
+          </a:bodyPr>
+          <a:lstStyle/>
+          <a:p>
+            <a:r>
+              <a:rPr lang="fr-FR" dirty="0"/>
+              <a:t>Linéarisation</a:t>
+            </a:r>
+          </a:p>
+          <a:p>
+            <a:pPr>
+              <a:lnSpc>
+                <a:spcPct val="150000"/>
+              </a:lnSpc>
+              <a:buFont typeface="Arial" pitchFamily="34" charset="0"/>
+              <a:buChar char="•"/>
+            </a:pPr>
+            <a:r>
+              <a:rPr lang="fr-FR" dirty="0"/>
+              <a:t> Z = 179-2P/129</a:t>
+            </a:r>
+          </a:p>
+          <a:p>
+            <a:pPr>
+              <a:lnSpc>
+                <a:spcPct val="150000"/>
+              </a:lnSpc>
+              <a:buFont typeface="Arial" pitchFamily="34" charset="0"/>
+              <a:buChar char="•"/>
+            </a:pPr>
+            <a:r>
+              <a:rPr lang="fr-FR" dirty="0"/>
+              <a:t> Z = 147 -5P/376</a:t>
+            </a:r>
+          </a:p>
+          <a:p>
+            <a:pPr>
+              <a:lnSpc>
+                <a:spcPct val="150000"/>
+              </a:lnSpc>
+              <a:buFont typeface="Arial" pitchFamily="34" charset="0"/>
+              <a:buChar char="•"/>
+            </a:pPr>
+            <a:r>
+              <a:rPr lang="fr-FR" dirty="0"/>
+              <a:t> Z = 130-P/81</a:t>
+            </a:r>
+          </a:p>
+          <a:p>
+            <a:endParaRPr lang="fr-FR" dirty="0"/>
+          </a:p>
+          <a:p>
+            <a:endParaRPr lang="fr-FR" dirty="0"/>
+          </a:p>
+        </p:txBody>
+      </p:sp>
+      <p:cxnSp>
+        <p:nvCxnSpPr>
+          <p:cNvPr id="36" name="Connecteur droit avec flèche 35"/>
+          <p:cNvCxnSpPr/>
+          <p:nvPr/>
+        </p:nvCxnSpPr>
+        <p:spPr>
+          <a:xfrm rot="5400000" flipH="1" flipV="1">
+            <a:off x="6125649" y="4328045"/>
+            <a:ext cx="297894" cy="214316"/>
+          </a:xfrm>
+          <a:prstGeom prst="straightConnector1">
+            <a:avLst/>
+          </a:prstGeom>
+          <a:ln w="25400">
+            <a:solidFill>
+              <a:schemeClr val="tx1"/>
+            </a:solidFill>
+            <a:tailEnd type="arrow"/>
+          </a:ln>
+        </p:spPr>
+        <p:style>
+          <a:lnRef idx="1">
+            <a:schemeClr val="accent1"/>
+          </a:lnRef>
+          <a:fillRef idx="0">
+            <a:schemeClr val="accent1"/>
+          </a:fillRef>
+          <a:effectRef idx="0">
+            <a:schemeClr val="accent1"/>
+          </a:effectRef>
+          <a:fontRef idx="minor">
+            <a:schemeClr val="tx1"/>
+          </a:fontRef>
+        </p:style>
+      </p:cxnSp>
+      <p:cxnSp>
+        <p:nvCxnSpPr>
+          <p:cNvPr id="37" name="Connecteur droit avec flèche 36"/>
+          <p:cNvCxnSpPr/>
+          <p:nvPr/>
+        </p:nvCxnSpPr>
+        <p:spPr>
+          <a:xfrm rot="16200000" flipH="1">
+            <a:off x="5988843" y="5179231"/>
+            <a:ext cx="285752" cy="214314"/>
+          </a:xfrm>
+          <a:prstGeom prst="straightConnector1">
+            <a:avLst/>
+          </a:prstGeom>
+          <a:ln w="25400">
+            <a:solidFill>
+              <a:schemeClr val="tx1"/>
+            </a:solidFill>
+            <a:tailEnd type="arrow"/>
+          </a:ln>
+        </p:spPr>
+        <p:style>
+          <a:lnRef idx="1">
+            <a:schemeClr val="accent1"/>
+          </a:lnRef>
+          <a:fillRef idx="0">
+            <a:schemeClr val="accent1"/>
+          </a:fillRef>
+          <a:effectRef idx="0">
+            <a:schemeClr val="accent1"/>
+          </a:effectRef>
+          <a:fontRef idx="minor">
+            <a:schemeClr val="tx1"/>
+          </a:fontRef>
+        </p:style>
+      </p:cxnSp>
+      <p:cxnSp>
+        <p:nvCxnSpPr>
+          <p:cNvPr id="38" name="Connecteur droit avec flèche 37"/>
+          <p:cNvCxnSpPr/>
+          <p:nvPr/>
+        </p:nvCxnSpPr>
+        <p:spPr>
+          <a:xfrm flipV="1">
+            <a:off x="6167438" y="4857760"/>
+            <a:ext cx="357190" cy="12142"/>
+          </a:xfrm>
+          <a:prstGeom prst="straightConnector1">
+            <a:avLst/>
+          </a:prstGeom>
+          <a:ln w="25400">
+            <a:solidFill>
+              <a:schemeClr val="tx1"/>
+            </a:solidFill>
+            <a:tailEnd type="arrow"/>
+          </a:ln>
+        </p:spPr>
+        <p:style>
+          <a:lnRef idx="1">
+            <a:schemeClr val="accent1"/>
+          </a:lnRef>
+          <a:fillRef idx="0">
+            <a:schemeClr val="accent1"/>
+          </a:fillRef>
+          <a:effectRef idx="0">
+            <a:schemeClr val="accent1"/>
+          </a:effectRef>
+          <a:fontRef idx="minor">
+            <a:schemeClr val="tx1"/>
+          </a:fontRef>
+        </p:style>
+      </p:cxnSp>
+      <p:sp>
+        <p:nvSpPr>
+          <p:cNvPr id="40" name="Flèche vers le bas 39"/>
+          <p:cNvSpPr/>
+          <p:nvPr/>
+        </p:nvSpPr>
+        <p:spPr>
+          <a:xfrm>
+            <a:off x="8953520" y="3714752"/>
+            <a:ext cx="214314" cy="500066"/>
+          </a:xfrm>
+          <a:prstGeom prst="downArrow">
+            <a:avLst/>
+          </a:prstGeom>
+        </p:spPr>
+        <p:style>
+          <a:lnRef idx="2">
+            <a:schemeClr val="accent1">
+              <a:shade val="50000"/>
+            </a:schemeClr>
+          </a:lnRef>
+          <a:fillRef idx="1">
+            <a:schemeClr val="accent1"/>
+          </a:fillRef>
+          <a:effectRef idx="0">
+            <a:schemeClr val="accent1"/>
+          </a:effectRef>
+          <a:fontRef idx="minor">
+            <a:schemeClr val="lt1"/>
+          </a:fontRef>
+        </p:style>
+        <p:txBody>
+          <a:bodyPr rtlCol="0" anchor="ctr"/>
+          <a:lstStyle/>
+          <a:p>
+            <a:pPr algn="ctr"/>
+            <a:endParaRPr lang="fr-FR"/>
+          </a:p>
+        </p:txBody>
+      </p:sp>
+      <p:sp>
+        <p:nvSpPr>
+          <p:cNvPr id="42" name="ZoneTexte 41"/>
+          <p:cNvSpPr txBox="1"/>
+          <p:nvPr/>
+        </p:nvSpPr>
+        <p:spPr>
+          <a:xfrm>
+            <a:off x="7453322" y="4357694"/>
+            <a:ext cx="3000396" cy="1477328"/>
+          </a:xfrm>
+          <a:prstGeom prst="rect">
+            <a:avLst/>
+          </a:prstGeom>
+          <a:noFill/>
+        </p:spPr>
+        <p:txBody>
+          <a:bodyPr wrap="square" rtlCol="0">
+            <a:spAutoFit/>
+          </a:bodyPr>
+          <a:lstStyle/>
+          <a:p>
+            <a:r>
+              <a:rPr lang="en-US" dirty="0"/>
+              <a:t>1 : Settled Fine	</a:t>
+            </a:r>
+          </a:p>
+          <a:p>
+            <a:r>
+              <a:rPr lang="en-US" dirty="0"/>
+              <a:t>2 : Fine Weather	</a:t>
+            </a:r>
+          </a:p>
+          <a:p>
+            <a:r>
+              <a:rPr lang="en-US" dirty="0"/>
+              <a:t>3 : Fine Becoming  les settled</a:t>
+            </a:r>
+          </a:p>
+          <a:p>
+            <a:r>
+              <a:rPr lang="en-US" dirty="0"/>
+              <a:t>…	</a:t>
+            </a:r>
+          </a:p>
+          <a:p>
+            <a:endParaRPr lang="fr-FR" dirty="0"/>
           </a:p>
         </p:txBody>
       </p:sp>
     </p:spTree>
-    <p:extLst>
-      <p:ext uri="{BB962C8B-B14F-4D97-AF65-F5344CB8AC3E}">
-        <p14:creationId xmlns:p14="http://schemas.microsoft.com/office/powerpoint/2010/main" val="306338394"/>
-      </p:ext>
-    </p:extLst>
   </p:cSld>
   <p:clrMapOvr>
     <a:masterClrMapping/>
@@ -4456,6 +5863,755 @@
       </p:grpSpPr>
       <p:sp>
         <p:nvSpPr>
+          <p:cNvPr id="3" name="Titre 3"/>
+          <p:cNvSpPr>
+            <a:spLocks noGrp="1"/>
+          </p:cNvSpPr>
+          <p:nvPr>
+            <p:ph type="title"/>
+          </p:nvPr>
+        </p:nvSpPr>
+        <p:spPr>
+          <a:xfrm>
+            <a:off x="1881158" y="357166"/>
+            <a:ext cx="8229600" cy="631844"/>
+          </a:xfrm>
+        </p:spPr>
+        <p:txBody>
+          <a:bodyPr>
+            <a:normAutofit fontScale="90000"/>
+          </a:bodyPr>
+          <a:lstStyle/>
+          <a:p>
+            <a:r>
+              <a:rPr lang="fr-FR" sz="4000" dirty="0"/>
+              <a:t>Algorithme de </a:t>
+            </a:r>
+            <a:r>
+              <a:rPr lang="fr-FR" sz="4000" dirty="0" err="1"/>
+              <a:t>Zambretti</a:t>
+            </a:r>
+            <a:r>
+              <a:rPr lang="fr-FR" sz="4000" dirty="0"/>
+              <a:t> implémenté</a:t>
+            </a:r>
+          </a:p>
+        </p:txBody>
+      </p:sp>
+      <p:sp>
+        <p:nvSpPr>
+          <p:cNvPr id="4" name="ZoneTexte 3"/>
+          <p:cNvSpPr txBox="1"/>
+          <p:nvPr/>
+        </p:nvSpPr>
+        <p:spPr>
+          <a:xfrm>
+            <a:off x="2881290" y="1714488"/>
+            <a:ext cx="5929354" cy="2862322"/>
+          </a:xfrm>
+          <a:prstGeom prst="rect">
+            <a:avLst/>
+          </a:prstGeom>
+          <a:noFill/>
+        </p:spPr>
+        <p:txBody>
+          <a:bodyPr wrap="square" rtlCol="0">
+            <a:spAutoFit/>
+          </a:bodyPr>
+          <a:lstStyle/>
+          <a:p>
+            <a:r>
+              <a:rPr lang="fr-FR" dirty="0"/>
+              <a:t>Remarques sup (optionnel:</a:t>
+            </a:r>
+          </a:p>
+          <a:p>
+            <a:endParaRPr lang="fr-FR" dirty="0"/>
+          </a:p>
+          <a:p>
+            <a:r>
+              <a:rPr lang="fr-FR" dirty="0"/>
+              <a:t>Intervalles de pression</a:t>
+            </a:r>
+          </a:p>
+          <a:p>
+            <a:endParaRPr lang="fr-FR" dirty="0"/>
+          </a:p>
+          <a:p>
+            <a:r>
+              <a:rPr lang="fr-FR" dirty="0"/>
+              <a:t>Transit de l’erreur au travers du code/ accords initiaux en binôme</a:t>
+            </a:r>
+          </a:p>
+          <a:p>
+            <a:endParaRPr lang="fr-FR" dirty="0"/>
+          </a:p>
+          <a:p>
+            <a:r>
+              <a:rPr lang="fr-FR" dirty="0"/>
+              <a:t>Erreurs (+ ou – une unité de Z)</a:t>
+            </a:r>
+          </a:p>
+          <a:p>
+            <a:endParaRPr lang="fr-FR" dirty="0"/>
+          </a:p>
+          <a:p>
+            <a:endParaRPr lang="fr-FR" dirty="0"/>
+          </a:p>
+        </p:txBody>
+      </p:sp>
+    </p:spTree>
+  </p:cSld>
+  <p:clrMapOvr>
+    <a:masterClrMapping/>
+  </p:clrMapOvr>
+</p:sld>
+</file>
+
+<file path=ppt/slides/slide15.xml><?xml version="1.0" encoding="utf-8"?>
+<p:sld xmlns:a="http://schemas.openxmlformats.org/drawingml/2006/main" xmlns:r="http://schemas.openxmlformats.org/officeDocument/2006/relationships" xmlns:p="http://schemas.openxmlformats.org/presentationml/2006/main">
+  <p:cSld>
+    <p:spTree>
+      <p:nvGrpSpPr>
+        <p:cNvPr id="1" name=""/>
+        <p:cNvGrpSpPr/>
+        <p:nvPr/>
+      </p:nvGrpSpPr>
+      <p:grpSpPr>
+        <a:xfrm>
+          <a:off x="0" y="0"/>
+          <a:ext cx="0" cy="0"/>
+          <a:chOff x="0" y="0"/>
+          <a:chExt cx="0" cy="0"/>
+        </a:xfrm>
+      </p:grpSpPr>
+      <p:sp>
+        <p:nvSpPr>
+          <p:cNvPr id="4" name="Titre 3"/>
+          <p:cNvSpPr>
+            <a:spLocks noGrp="1"/>
+          </p:cNvSpPr>
+          <p:nvPr>
+            <p:ph type="title"/>
+          </p:nvPr>
+        </p:nvSpPr>
+        <p:spPr>
+          <a:xfrm>
+            <a:off x="1881158" y="357166"/>
+            <a:ext cx="8229600" cy="631844"/>
+          </a:xfrm>
+        </p:spPr>
+        <p:txBody>
+          <a:bodyPr>
+            <a:normAutofit fontScale="90000"/>
+          </a:bodyPr>
+          <a:lstStyle/>
+          <a:p>
+            <a:r>
+              <a:rPr lang="fr-FR" sz="4000" dirty="0"/>
+              <a:t>Etat du travail:</a:t>
+            </a:r>
+          </a:p>
+        </p:txBody>
+      </p:sp>
+      <p:sp>
+        <p:nvSpPr>
+          <p:cNvPr id="5" name="ZoneTexte 4"/>
+          <p:cNvSpPr txBox="1"/>
+          <p:nvPr/>
+        </p:nvSpPr>
+        <p:spPr>
+          <a:xfrm>
+            <a:off x="2381224" y="1571612"/>
+            <a:ext cx="7000924" cy="4801314"/>
+          </a:xfrm>
+          <a:prstGeom prst="rect">
+            <a:avLst/>
+          </a:prstGeom>
+          <a:noFill/>
+        </p:spPr>
+        <p:txBody>
+          <a:bodyPr wrap="square" rtlCol="0">
+            <a:spAutoFit/>
+          </a:bodyPr>
+          <a:lstStyle/>
+          <a:p>
+            <a:pPr>
+              <a:lnSpc>
+                <a:spcPct val="150000"/>
+              </a:lnSpc>
+            </a:pPr>
+            <a:r>
+              <a:rPr lang="fr-FR" b="1" dirty="0"/>
+              <a:t>Travail effectué: </a:t>
+            </a:r>
+          </a:p>
+          <a:p>
+            <a:pPr>
+              <a:lnSpc>
+                <a:spcPct val="150000"/>
+              </a:lnSpc>
+              <a:buFont typeface="Arial" pitchFamily="34" charset="0"/>
+              <a:buChar char="•"/>
+            </a:pPr>
+            <a:r>
+              <a:rPr lang="fr-FR" dirty="0"/>
+              <a:t>Algorithme de </a:t>
+            </a:r>
+            <a:r>
+              <a:rPr lang="fr-FR" dirty="0" err="1"/>
+              <a:t>Zambretti</a:t>
+            </a:r>
+            <a:r>
+              <a:rPr lang="fr-FR" dirty="0"/>
+              <a:t> codé</a:t>
+            </a:r>
+          </a:p>
+          <a:p>
+            <a:pPr>
+              <a:lnSpc>
+                <a:spcPct val="150000"/>
+              </a:lnSpc>
+              <a:buFont typeface="Arial" pitchFamily="34" charset="0"/>
+              <a:buChar char="•"/>
+            </a:pPr>
+            <a:r>
+              <a:rPr lang="fr-FR" dirty="0"/>
+              <a:t> Interface utilisateur réalisée</a:t>
+            </a:r>
+          </a:p>
+          <a:p>
+            <a:pPr>
+              <a:lnSpc>
+                <a:spcPct val="150000"/>
+              </a:lnSpc>
+            </a:pPr>
+            <a:endParaRPr lang="fr-FR" dirty="0"/>
+          </a:p>
+          <a:p>
+            <a:pPr>
+              <a:lnSpc>
+                <a:spcPct val="150000"/>
+              </a:lnSpc>
+            </a:pPr>
+            <a:r>
+              <a:rPr lang="fr-FR" b="1" dirty="0"/>
+              <a:t>Prochaines étapes:</a:t>
+            </a:r>
+          </a:p>
+          <a:p>
+            <a:pPr>
+              <a:lnSpc>
+                <a:spcPct val="150000"/>
+              </a:lnSpc>
+              <a:buFont typeface="Arial" pitchFamily="34" charset="0"/>
+              <a:buChar char="•"/>
+            </a:pPr>
+            <a:r>
+              <a:rPr lang="fr-FR" dirty="0"/>
+              <a:t> Assemblage (en cours)</a:t>
+            </a:r>
+          </a:p>
+          <a:p>
+            <a:pPr>
+              <a:lnSpc>
+                <a:spcPct val="150000"/>
+              </a:lnSpc>
+              <a:buFont typeface="Arial" pitchFamily="34" charset="0"/>
+              <a:buChar char="•"/>
+            </a:pPr>
+            <a:r>
+              <a:rPr lang="fr-FR" dirty="0"/>
+              <a:t> Interface données capteur .C / code POO .C++ (en cours)</a:t>
+            </a:r>
+          </a:p>
+          <a:p>
+            <a:pPr>
+              <a:lnSpc>
+                <a:spcPct val="150000"/>
+              </a:lnSpc>
+              <a:buFont typeface="Arial" pitchFamily="34" charset="0"/>
+              <a:buChar char="•"/>
+            </a:pPr>
+            <a:r>
+              <a:rPr lang="fr-FR" dirty="0"/>
+              <a:t> Historisation des données </a:t>
+            </a:r>
+          </a:p>
+          <a:p>
+            <a:endParaRPr lang="fr-FR" dirty="0"/>
+          </a:p>
+          <a:p>
+            <a:endParaRPr lang="fr-FR" dirty="0"/>
+          </a:p>
+          <a:p>
+            <a:endParaRPr lang="fr-FR" dirty="0"/>
+          </a:p>
+          <a:p>
+            <a:endParaRPr lang="fr-FR" dirty="0"/>
+          </a:p>
+          <a:p>
+            <a:endParaRPr lang="fr-FR" dirty="0"/>
+          </a:p>
+        </p:txBody>
+      </p:sp>
+    </p:spTree>
+  </p:cSld>
+  <p:clrMapOvr>
+    <a:masterClrMapping/>
+  </p:clrMapOvr>
+</p:sld>
+</file>
+
+<file path=ppt/slides/slide16.xml><?xml version="1.0" encoding="utf-8"?>
+<p:sld xmlns:a="http://schemas.openxmlformats.org/drawingml/2006/main" xmlns:r="http://schemas.openxmlformats.org/officeDocument/2006/relationships" xmlns:p="http://schemas.openxmlformats.org/presentationml/2006/main">
+  <p:cSld>
+    <p:spTree>
+      <p:nvGrpSpPr>
+        <p:cNvPr id="1" name=""/>
+        <p:cNvGrpSpPr/>
+        <p:nvPr/>
+      </p:nvGrpSpPr>
+      <p:grpSpPr>
+        <a:xfrm>
+          <a:off x="0" y="0"/>
+          <a:ext cx="0" cy="0"/>
+          <a:chOff x="0" y="0"/>
+          <a:chExt cx="0" cy="0"/>
+        </a:xfrm>
+      </p:grpSpPr>
+      <p:sp>
+        <p:nvSpPr>
+          <p:cNvPr id="2" name="Titre 1">
+            <a:extLst>
+              <a:ext uri="{FF2B5EF4-FFF2-40B4-BE49-F238E27FC236}">
+                <a16:creationId xmlns:a16="http://schemas.microsoft.com/office/drawing/2014/main" id="{C7BE326B-715B-4426-BD4C-06E41100F853}"/>
+              </a:ext>
+            </a:extLst>
+          </p:cNvPr>
+          <p:cNvSpPr>
+            <a:spLocks noGrp="1"/>
+          </p:cNvSpPr>
+          <p:nvPr>
+            <p:ph type="title"/>
+          </p:nvPr>
+        </p:nvSpPr>
+        <p:spPr/>
+        <p:txBody>
+          <a:bodyPr/>
+          <a:lstStyle/>
+          <a:p>
+            <a:r>
+              <a:rPr lang="fr-FR" dirty="0"/>
+              <a:t>Tests</a:t>
+            </a:r>
+            <a:endParaRPr lang="en-US" dirty="0"/>
+          </a:p>
+        </p:txBody>
+      </p:sp>
+      <p:sp>
+        <p:nvSpPr>
+          <p:cNvPr id="3" name="Espace réservé du contenu 2">
+            <a:extLst>
+              <a:ext uri="{FF2B5EF4-FFF2-40B4-BE49-F238E27FC236}">
+                <a16:creationId xmlns:a16="http://schemas.microsoft.com/office/drawing/2014/main" id="{C8EC75DF-2FB2-4388-B226-AD8772E82D5C}"/>
+              </a:ext>
+            </a:extLst>
+          </p:cNvPr>
+          <p:cNvSpPr>
+            <a:spLocks noGrp="1"/>
+          </p:cNvSpPr>
+          <p:nvPr>
+            <p:ph idx="1"/>
+          </p:nvPr>
+        </p:nvSpPr>
+        <p:spPr/>
+        <p:txBody>
+          <a:bodyPr/>
+          <a:lstStyle/>
+          <a:p>
+            <a:r>
+              <a:rPr lang="fr-FR" dirty="0"/>
+              <a:t>Environnement de suite de tests unitaires </a:t>
+            </a:r>
+            <a:r>
+              <a:rPr lang="fr-FR" dirty="0" err="1"/>
+              <a:t>cppunit</a:t>
+            </a:r>
+            <a:endParaRPr lang="en-US" dirty="0"/>
+          </a:p>
+          <a:p>
+            <a:endParaRPr lang="fr-FR" dirty="0"/>
+          </a:p>
+          <a:p>
+            <a:r>
+              <a:rPr lang="fr-FR" dirty="0"/>
+              <a:t>Cas:</a:t>
+            </a:r>
+          </a:p>
+          <a:p>
+            <a:pPr lvl="1"/>
+            <a:r>
+              <a:rPr lang="fr-FR" dirty="0"/>
+              <a:t> Pas de mesures produites par les capteurs</a:t>
+            </a:r>
+          </a:p>
+        </p:txBody>
+      </p:sp>
+      <p:sp>
+        <p:nvSpPr>
+          <p:cNvPr id="4" name="Espace réservé du numéro de diapositive 3">
+            <a:extLst>
+              <a:ext uri="{FF2B5EF4-FFF2-40B4-BE49-F238E27FC236}">
+                <a16:creationId xmlns:a16="http://schemas.microsoft.com/office/drawing/2014/main" id="{5E5734B6-7182-4A17-8C04-B19EB308B116}"/>
+              </a:ext>
+            </a:extLst>
+          </p:cNvPr>
+          <p:cNvSpPr>
+            <a:spLocks noGrp="1"/>
+          </p:cNvSpPr>
+          <p:nvPr>
+            <p:ph type="sldNum" sz="quarter" idx="12"/>
+          </p:nvPr>
+        </p:nvSpPr>
+        <p:spPr/>
+        <p:txBody>
+          <a:bodyPr/>
+          <a:lstStyle/>
+          <a:p>
+            <a:fld id="{B4C56C5B-B224-400D-A2FE-072C37A0476F}" type="slidenum">
+              <a:rPr lang="en-US" smtClean="0"/>
+              <a:t>16</a:t>
+            </a:fld>
+            <a:endParaRPr lang="en-US"/>
+          </a:p>
+        </p:txBody>
+      </p:sp>
+    </p:spTree>
+    <p:extLst>
+      <p:ext uri="{BB962C8B-B14F-4D97-AF65-F5344CB8AC3E}">
+        <p14:creationId xmlns:p14="http://schemas.microsoft.com/office/powerpoint/2010/main" val="4026249942"/>
+      </p:ext>
+    </p:extLst>
+  </p:cSld>
+  <p:clrMapOvr>
+    <a:masterClrMapping/>
+  </p:clrMapOvr>
+</p:sld>
+</file>
+
+<file path=ppt/slides/slide17.xml><?xml version="1.0" encoding="utf-8"?>
+<p:sld xmlns:a="http://schemas.openxmlformats.org/drawingml/2006/main" xmlns:r="http://schemas.openxmlformats.org/officeDocument/2006/relationships" xmlns:p="http://schemas.openxmlformats.org/presentationml/2006/main">
+  <p:cSld>
+    <p:spTree>
+      <p:nvGrpSpPr>
+        <p:cNvPr id="1" name=""/>
+        <p:cNvGrpSpPr/>
+        <p:nvPr/>
+      </p:nvGrpSpPr>
+      <p:grpSpPr>
+        <a:xfrm>
+          <a:off x="0" y="0"/>
+          <a:ext cx="0" cy="0"/>
+          <a:chOff x="0" y="0"/>
+          <a:chExt cx="0" cy="0"/>
+        </a:xfrm>
+      </p:grpSpPr>
+      <p:sp>
+        <p:nvSpPr>
+          <p:cNvPr id="2" name="Titre 1">
+            <a:extLst>
+              <a:ext uri="{FF2B5EF4-FFF2-40B4-BE49-F238E27FC236}">
+                <a16:creationId xmlns:a16="http://schemas.microsoft.com/office/drawing/2014/main" id="{C7BE326B-715B-4426-BD4C-06E41100F853}"/>
+              </a:ext>
+            </a:extLst>
+          </p:cNvPr>
+          <p:cNvSpPr>
+            <a:spLocks noGrp="1"/>
+          </p:cNvSpPr>
+          <p:nvPr>
+            <p:ph type="title"/>
+          </p:nvPr>
+        </p:nvSpPr>
+        <p:spPr/>
+        <p:txBody>
+          <a:bodyPr/>
+          <a:lstStyle/>
+          <a:p>
+            <a:r>
+              <a:rPr lang="fr-FR" dirty="0"/>
+              <a:t>Déploiement: installation par paquet Debian</a:t>
+            </a:r>
+            <a:endParaRPr lang="en-US" dirty="0"/>
+          </a:p>
+        </p:txBody>
+      </p:sp>
+      <p:sp>
+        <p:nvSpPr>
+          <p:cNvPr id="3" name="Espace réservé du contenu 2">
+            <a:extLst>
+              <a:ext uri="{FF2B5EF4-FFF2-40B4-BE49-F238E27FC236}">
+                <a16:creationId xmlns:a16="http://schemas.microsoft.com/office/drawing/2014/main" id="{C8EC75DF-2FB2-4388-B226-AD8772E82D5C}"/>
+              </a:ext>
+            </a:extLst>
+          </p:cNvPr>
+          <p:cNvSpPr>
+            <a:spLocks noGrp="1"/>
+          </p:cNvSpPr>
+          <p:nvPr>
+            <p:ph idx="1"/>
+          </p:nvPr>
+        </p:nvSpPr>
+        <p:spPr/>
+        <p:txBody>
+          <a:bodyPr/>
+          <a:lstStyle/>
+          <a:p>
+            <a:r>
+              <a:rPr lang="fr-FR" dirty="0"/>
+              <a:t>Téléchargement depuis GitHub du paquet contenant le binaire</a:t>
+            </a:r>
+          </a:p>
+          <a:p>
+            <a:r>
+              <a:rPr lang="fr-FR" dirty="0"/>
+              <a:t>Installation avec </a:t>
+            </a:r>
+            <a:r>
+              <a:rPr lang="fr-FR" dirty="0" err="1"/>
+              <a:t>dpkg</a:t>
+            </a:r>
+            <a:r>
+              <a:rPr lang="fr-FR" dirty="0"/>
+              <a:t> –i &lt;nom de l’application&gt;</a:t>
+            </a:r>
+            <a:endParaRPr lang="en-US" dirty="0"/>
+          </a:p>
+        </p:txBody>
+      </p:sp>
+      <p:sp>
+        <p:nvSpPr>
+          <p:cNvPr id="4" name="Espace réservé du numéro de diapositive 3">
+            <a:extLst>
+              <a:ext uri="{FF2B5EF4-FFF2-40B4-BE49-F238E27FC236}">
+                <a16:creationId xmlns:a16="http://schemas.microsoft.com/office/drawing/2014/main" id="{5E5734B6-7182-4A17-8C04-B19EB308B116}"/>
+              </a:ext>
+            </a:extLst>
+          </p:cNvPr>
+          <p:cNvSpPr>
+            <a:spLocks noGrp="1"/>
+          </p:cNvSpPr>
+          <p:nvPr>
+            <p:ph type="sldNum" sz="quarter" idx="12"/>
+          </p:nvPr>
+        </p:nvSpPr>
+        <p:spPr/>
+        <p:txBody>
+          <a:bodyPr/>
+          <a:lstStyle/>
+          <a:p>
+            <a:fld id="{B4C56C5B-B224-400D-A2FE-072C37A0476F}" type="slidenum">
+              <a:rPr lang="en-US" smtClean="0"/>
+              <a:t>17</a:t>
+            </a:fld>
+            <a:endParaRPr lang="en-US"/>
+          </a:p>
+        </p:txBody>
+      </p:sp>
+    </p:spTree>
+    <p:extLst>
+      <p:ext uri="{BB962C8B-B14F-4D97-AF65-F5344CB8AC3E}">
+        <p14:creationId xmlns:p14="http://schemas.microsoft.com/office/powerpoint/2010/main" val="728810438"/>
+      </p:ext>
+    </p:extLst>
+  </p:cSld>
+  <p:clrMapOvr>
+    <a:masterClrMapping/>
+  </p:clrMapOvr>
+</p:sld>
+</file>
+
+<file path=ppt/slides/slide18.xml><?xml version="1.0" encoding="utf-8"?>
+<p:sld xmlns:a="http://schemas.openxmlformats.org/drawingml/2006/main" xmlns:r="http://schemas.openxmlformats.org/officeDocument/2006/relationships" xmlns:p="http://schemas.openxmlformats.org/presentationml/2006/main">
+  <p:cSld>
+    <p:spTree>
+      <p:nvGrpSpPr>
+        <p:cNvPr id="1" name=""/>
+        <p:cNvGrpSpPr/>
+        <p:nvPr/>
+      </p:nvGrpSpPr>
+      <p:grpSpPr>
+        <a:xfrm>
+          <a:off x="0" y="0"/>
+          <a:ext cx="0" cy="0"/>
+          <a:chOff x="0" y="0"/>
+          <a:chExt cx="0" cy="0"/>
+        </a:xfrm>
+      </p:grpSpPr>
+      <p:sp>
+        <p:nvSpPr>
+          <p:cNvPr id="2" name="Titre 1">
+            <a:extLst>
+              <a:ext uri="{FF2B5EF4-FFF2-40B4-BE49-F238E27FC236}">
+                <a16:creationId xmlns:a16="http://schemas.microsoft.com/office/drawing/2014/main" id="{C7BE326B-715B-4426-BD4C-06E41100F853}"/>
+              </a:ext>
+            </a:extLst>
+          </p:cNvPr>
+          <p:cNvSpPr>
+            <a:spLocks noGrp="1"/>
+          </p:cNvSpPr>
+          <p:nvPr>
+            <p:ph type="title"/>
+          </p:nvPr>
+        </p:nvSpPr>
+        <p:spPr/>
+        <p:txBody>
+          <a:bodyPr/>
+          <a:lstStyle/>
+          <a:p>
+            <a:r>
+              <a:rPr lang="fr-FR" dirty="0"/>
+              <a:t>Conclusions</a:t>
+            </a:r>
+            <a:endParaRPr lang="en-US" dirty="0"/>
+          </a:p>
+        </p:txBody>
+      </p:sp>
+      <p:sp>
+        <p:nvSpPr>
+          <p:cNvPr id="3" name="Espace réservé du contenu 2">
+            <a:extLst>
+              <a:ext uri="{FF2B5EF4-FFF2-40B4-BE49-F238E27FC236}">
+                <a16:creationId xmlns:a16="http://schemas.microsoft.com/office/drawing/2014/main" id="{C8EC75DF-2FB2-4388-B226-AD8772E82D5C}"/>
+              </a:ext>
+            </a:extLst>
+          </p:cNvPr>
+          <p:cNvSpPr>
+            <a:spLocks noGrp="1"/>
+          </p:cNvSpPr>
+          <p:nvPr>
+            <p:ph idx="1"/>
+          </p:nvPr>
+        </p:nvSpPr>
+        <p:spPr/>
+        <p:txBody>
+          <a:bodyPr/>
+          <a:lstStyle/>
+          <a:p>
+            <a:r>
+              <a:rPr lang="fr-FR" dirty="0"/>
+              <a:t>Développement efficace:</a:t>
+            </a:r>
+          </a:p>
+          <a:p>
+            <a:pPr lvl="1"/>
+            <a:r>
+              <a:rPr lang="fr-FR" dirty="0"/>
+              <a:t>Prévoyance des contraintes.</a:t>
+            </a:r>
+          </a:p>
+          <a:p>
+            <a:pPr lvl="1"/>
+            <a:r>
+              <a:rPr lang="fr-FR" dirty="0"/>
+              <a:t>Adaptation par le suivit quotidien de l’avance du projet.</a:t>
+            </a:r>
+          </a:p>
+          <a:p>
+            <a:pPr lvl="1"/>
+            <a:r>
+              <a:rPr lang="fr-FR" dirty="0"/>
+              <a:t>Production d’un livrable.</a:t>
+            </a:r>
+          </a:p>
+          <a:p>
+            <a:pPr lvl="1"/>
+            <a:endParaRPr lang="fr-FR" dirty="0"/>
+          </a:p>
+          <a:p>
+            <a:r>
+              <a:rPr lang="fr-FR" dirty="0"/>
+              <a:t>Prototype valide par des tests.</a:t>
+            </a:r>
+          </a:p>
+          <a:p>
+            <a:r>
+              <a:rPr lang="fr-FR" dirty="0"/>
+              <a:t>Facilite de déploiement.</a:t>
+            </a:r>
+          </a:p>
+          <a:p>
+            <a:endParaRPr lang="fr-FR" dirty="0"/>
+          </a:p>
+          <a:p>
+            <a:endParaRPr lang="fr-FR" dirty="0"/>
+          </a:p>
+          <a:p>
+            <a:endParaRPr lang="en-US" dirty="0"/>
+          </a:p>
+        </p:txBody>
+      </p:sp>
+      <p:sp>
+        <p:nvSpPr>
+          <p:cNvPr id="4" name="Espace réservé du numéro de diapositive 3">
+            <a:extLst>
+              <a:ext uri="{FF2B5EF4-FFF2-40B4-BE49-F238E27FC236}">
+                <a16:creationId xmlns:a16="http://schemas.microsoft.com/office/drawing/2014/main" id="{5E5734B6-7182-4A17-8C04-B19EB308B116}"/>
+              </a:ext>
+            </a:extLst>
+          </p:cNvPr>
+          <p:cNvSpPr>
+            <a:spLocks noGrp="1"/>
+          </p:cNvSpPr>
+          <p:nvPr>
+            <p:ph type="sldNum" sz="quarter" idx="12"/>
+          </p:nvPr>
+        </p:nvSpPr>
+        <p:spPr/>
+        <p:txBody>
+          <a:bodyPr/>
+          <a:lstStyle/>
+          <a:p>
+            <a:fld id="{B4C56C5B-B224-400D-A2FE-072C37A0476F}" type="slidenum">
+              <a:rPr lang="en-US" smtClean="0"/>
+              <a:t>18</a:t>
+            </a:fld>
+            <a:endParaRPr lang="en-US"/>
+          </a:p>
+        </p:txBody>
+      </p:sp>
+    </p:spTree>
+    <p:extLst>
+      <p:ext uri="{BB962C8B-B14F-4D97-AF65-F5344CB8AC3E}">
+        <p14:creationId xmlns:p14="http://schemas.microsoft.com/office/powerpoint/2010/main" val="306338394"/>
+      </p:ext>
+    </p:extLst>
+  </p:cSld>
+  <p:clrMapOvr>
+    <a:masterClrMapping/>
+  </p:clrMapOvr>
+</p:sld>
+</file>
+
+<file path=ppt/slides/slide19.xml><?xml version="1.0" encoding="utf-8"?>
+<p:sld xmlns:a="http://schemas.openxmlformats.org/drawingml/2006/main" xmlns:r="http://schemas.openxmlformats.org/officeDocument/2006/relationships" xmlns:p="http://schemas.openxmlformats.org/presentationml/2006/main">
+  <p:cSld>
+    <p:spTree>
+      <p:nvGrpSpPr>
+        <p:cNvPr id="1" name=""/>
+        <p:cNvGrpSpPr/>
+        <p:nvPr/>
+      </p:nvGrpSpPr>
+      <p:grpSpPr>
+        <a:xfrm>
+          <a:off x="0" y="0"/>
+          <a:ext cx="0" cy="0"/>
+          <a:chOff x="0" y="0"/>
+          <a:chExt cx="0" cy="0"/>
+        </a:xfrm>
+      </p:grpSpPr>
+      <p:sp>
+        <p:nvSpPr>
           <p:cNvPr id="3" name="Espace réservé du contenu 2">
             <a:extLst>
               <a:ext uri="{FF2B5EF4-FFF2-40B4-BE49-F238E27FC236}">
@@ -4510,7 +6666,7 @@
           <a:p>
             <a:fld id="{B4C56C5B-B224-400D-A2FE-072C37A0476F}" type="slidenum">
               <a:rPr lang="en-US" smtClean="0"/>
-              <a:t>14</a:t>
+              <a:t>19</a:t>
             </a:fld>
             <a:endParaRPr lang="en-US"/>
           </a:p>
@@ -5608,6 +7764,42 @@
           </a:p>
         </p:txBody>
       </p:sp>
+      <p:pic>
+        <p:nvPicPr>
+          <p:cNvPr id="5" name="Image 4">
+            <a:extLst>
+              <a:ext uri="{FF2B5EF4-FFF2-40B4-BE49-F238E27FC236}">
+                <a16:creationId xmlns:a16="http://schemas.microsoft.com/office/drawing/2014/main" id="{E43A1C94-51E0-4F8A-A481-A2AE0B849926}"/>
+              </a:ext>
+            </a:extLst>
+          </p:cNvPr>
+          <p:cNvPicPr>
+            <a:picLocks noChangeAspect="1"/>
+          </p:cNvPicPr>
+          <p:nvPr/>
+        </p:nvPicPr>
+        <p:blipFill>
+          <a:blip r:embed="rId2">
+            <a:extLst>
+              <a:ext uri="{28A0092B-C50C-407E-A947-70E740481C1C}">
+                <a14:useLocalDpi xmlns:a14="http://schemas.microsoft.com/office/drawing/2010/main" val="0"/>
+              </a:ext>
+            </a:extLst>
+          </a:blip>
+          <a:stretch>
+            <a:fillRect/>
+          </a:stretch>
+        </p:blipFill>
+        <p:spPr>
+          <a:xfrm>
+            <a:off x="2031222" y="1235706"/>
+            <a:ext cx="8129556" cy="5485769"/>
+          </a:xfrm>
+          <a:prstGeom prst="rect">
+            <a:avLst/>
+          </a:prstGeom>
+        </p:spPr>
+      </p:pic>
     </p:spTree>
     <p:extLst>
       <p:ext uri="{BB962C8B-B14F-4D97-AF65-F5344CB8AC3E}">
@@ -5643,7 +7835,7 @@
           <p:cNvPr id="2" name="Titre 1">
             <a:extLst>
               <a:ext uri="{FF2B5EF4-FFF2-40B4-BE49-F238E27FC236}">
-                <a16:creationId xmlns:a16="http://schemas.microsoft.com/office/drawing/2014/main" id="{FF4F4BAF-F1D7-4C98-B1D6-D186AC154381}"/>
+                <a16:creationId xmlns:a16="http://schemas.microsoft.com/office/drawing/2014/main" id="{FAD8F993-6BF7-4083-B601-B0699BB9946C}"/>
               </a:ext>
             </a:extLst>
           </p:cNvPr>
@@ -5654,60 +7846,30 @@
             <p:ph type="title"/>
           </p:nvPr>
         </p:nvSpPr>
-        <p:spPr/>
+        <p:spPr>
+          <a:xfrm>
+            <a:off x="838200" y="199752"/>
+            <a:ext cx="10766898" cy="1325563"/>
+          </a:xfrm>
+        </p:spPr>
         <p:txBody>
           <a:bodyPr/>
           <a:lstStyle/>
           <a:p>
             <a:r>
               <a:rPr lang="fr-FR" dirty="0"/>
-              <a:t>Interface graphique: design</a:t>
+              <a:t>Planification: la gestion des taches avec Trello</a:t>
             </a:r>
             <a:endParaRPr lang="en-US" dirty="0"/>
           </a:p>
         </p:txBody>
       </p:sp>
-      <p:pic>
-        <p:nvPicPr>
-          <p:cNvPr id="6" name="Espace réservé du contenu 5">
-            <a:extLst>
-              <a:ext uri="{FF2B5EF4-FFF2-40B4-BE49-F238E27FC236}">
-                <a16:creationId xmlns:a16="http://schemas.microsoft.com/office/drawing/2014/main" id="{137692E6-B47D-46A4-9906-EB0151FA0588}"/>
-              </a:ext>
-            </a:extLst>
-          </p:cNvPr>
-          <p:cNvPicPr>
-            <a:picLocks noGrp="1" noChangeAspect="1"/>
-          </p:cNvPicPr>
-          <p:nvPr>
-            <p:ph idx="1"/>
-          </p:nvPr>
-        </p:nvPicPr>
-        <p:blipFill>
-          <a:blip r:embed="rId2">
-            <a:extLst>
-              <a:ext uri="{28A0092B-C50C-407E-A947-70E740481C1C}">
-                <a14:useLocalDpi xmlns:a14="http://schemas.microsoft.com/office/drawing/2010/main" val="0"/>
-              </a:ext>
-            </a:extLst>
-          </a:blip>
-          <a:stretch>
-            <a:fillRect/>
-          </a:stretch>
-        </p:blipFill>
-        <p:spPr>
-          <a:xfrm>
-            <a:off x="4811840" y="1825625"/>
-            <a:ext cx="2568319" cy="4351338"/>
-          </a:xfrm>
-        </p:spPr>
-      </p:pic>
       <p:sp>
         <p:nvSpPr>
           <p:cNvPr id="4" name="Espace réservé du numéro de diapositive 3">
             <a:extLst>
               <a:ext uri="{FF2B5EF4-FFF2-40B4-BE49-F238E27FC236}">
-                <a16:creationId xmlns:a16="http://schemas.microsoft.com/office/drawing/2014/main" id="{B279120F-2810-42A6-BD3B-5C40AAFD7CE5}"/>
+                <a16:creationId xmlns:a16="http://schemas.microsoft.com/office/drawing/2014/main" id="{9016AF9C-B41E-41F8-B737-DE9DC4A3CDFA}"/>
               </a:ext>
             </a:extLst>
           </p:cNvPr>
@@ -5731,10 +7893,40 @@
           </a:p>
         </p:txBody>
       </p:sp>
+      <p:pic>
+        <p:nvPicPr>
+          <p:cNvPr id="3" name="Image 2">
+            <a:extLst>
+              <a:ext uri="{FF2B5EF4-FFF2-40B4-BE49-F238E27FC236}">
+                <a16:creationId xmlns:a16="http://schemas.microsoft.com/office/drawing/2014/main" id="{06F300FE-4182-4D6A-96F7-7D7724C77AD4}"/>
+              </a:ext>
+            </a:extLst>
+          </p:cNvPr>
+          <p:cNvPicPr>
+            <a:picLocks noChangeAspect="1"/>
+          </p:cNvPicPr>
+          <p:nvPr/>
+        </p:nvPicPr>
+        <p:blipFill>
+          <a:blip r:embed="rId2"/>
+          <a:stretch>
+            <a:fillRect/>
+          </a:stretch>
+        </p:blipFill>
+        <p:spPr>
+          <a:xfrm>
+            <a:off x="0" y="1490446"/>
+            <a:ext cx="12192000" cy="5167802"/>
+          </a:xfrm>
+          <a:prstGeom prst="rect">
+            <a:avLst/>
+          </a:prstGeom>
+        </p:spPr>
+      </p:pic>
     </p:spTree>
     <p:extLst>
       <p:ext uri="{BB962C8B-B14F-4D97-AF65-F5344CB8AC3E}">
-        <p14:creationId xmlns:p14="http://schemas.microsoft.com/office/powerpoint/2010/main" val="4246114347"/>
+        <p14:creationId xmlns:p14="http://schemas.microsoft.com/office/powerpoint/2010/main" val="2963541461"/>
       </p:ext>
     </p:extLst>
   </p:cSld>
@@ -5777,19 +7969,14 @@
             <p:ph type="title"/>
           </p:nvPr>
         </p:nvSpPr>
-        <p:spPr>
-          <a:xfrm>
-            <a:off x="838200" y="263525"/>
-            <a:ext cx="10515600" cy="1325563"/>
-          </a:xfrm>
-        </p:spPr>
+        <p:spPr/>
         <p:txBody>
           <a:bodyPr/>
           <a:lstStyle/>
           <a:p>
             <a:r>
               <a:rPr lang="fr-FR" dirty="0"/>
-              <a:t>Interface graphique: diagramme de classe</a:t>
+              <a:t>Interface graphique: design</a:t>
             </a:r>
             <a:endParaRPr lang="en-US" dirty="0"/>
           </a:p>
@@ -5829,7 +8016,7 @@
           <p:cNvPr id="8" name="Image 7">
             <a:extLst>
               <a:ext uri="{FF2B5EF4-FFF2-40B4-BE49-F238E27FC236}">
-                <a16:creationId xmlns:a16="http://schemas.microsoft.com/office/drawing/2014/main" id="{F5E38A64-212F-46BE-8290-410B79DD84E7}"/>
+                <a16:creationId xmlns:a16="http://schemas.microsoft.com/office/drawing/2014/main" id="{CA520699-FCFF-458E-A4A9-6834E0A93C36}"/>
               </a:ext>
             </a:extLst>
           </p:cNvPr>
@@ -5839,31 +8026,387 @@
           <p:nvPr/>
         </p:nvPicPr>
         <p:blipFill>
-          <a:blip r:embed="rId2">
-            <a:extLst>
-              <a:ext uri="{28A0092B-C50C-407E-A947-70E740481C1C}">
-                <a14:useLocalDpi xmlns:a14="http://schemas.microsoft.com/office/drawing/2010/main" val="0"/>
-              </a:ext>
-            </a:extLst>
-          </a:blip>
+          <a:blip r:embed="rId2"/>
           <a:stretch>
             <a:fillRect/>
           </a:stretch>
         </p:blipFill>
         <p:spPr>
           <a:xfrm>
-            <a:off x="1324702" y="1589088"/>
-            <a:ext cx="8918524" cy="5015078"/>
+            <a:off x="4540956" y="1440216"/>
+            <a:ext cx="2909575" cy="5166606"/>
           </a:xfrm>
           <a:prstGeom prst="rect">
             <a:avLst/>
           </a:prstGeom>
         </p:spPr>
       </p:pic>
+      <p:sp>
+        <p:nvSpPr>
+          <p:cNvPr id="9" name="ZoneTexte 8">
+            <a:extLst>
+              <a:ext uri="{FF2B5EF4-FFF2-40B4-BE49-F238E27FC236}">
+                <a16:creationId xmlns:a16="http://schemas.microsoft.com/office/drawing/2014/main" id="{36C7E744-0B75-474C-9417-3A0C50B174E2}"/>
+              </a:ext>
+            </a:extLst>
+          </p:cNvPr>
+          <p:cNvSpPr txBox="1"/>
+          <p:nvPr/>
+        </p:nvSpPr>
+        <p:spPr>
+          <a:xfrm>
+            <a:off x="6592711" y="4718756"/>
+            <a:ext cx="300082" cy="369332"/>
+          </a:xfrm>
+          <a:prstGeom prst="rect">
+            <a:avLst/>
+          </a:prstGeom>
+          <a:noFill/>
+        </p:spPr>
+        <p:txBody>
+          <a:bodyPr wrap="none" rtlCol="0">
+            <a:spAutoFit/>
+          </a:bodyPr>
+          <a:lstStyle/>
+          <a:p>
+            <a:r>
+              <a:rPr lang="fr-FR" dirty="0"/>
+              <a:t>+</a:t>
+            </a:r>
+            <a:endParaRPr lang="en-US" dirty="0"/>
+          </a:p>
+        </p:txBody>
+      </p:sp>
+      <p:cxnSp>
+        <p:nvCxnSpPr>
+          <p:cNvPr id="11" name="Connecteur droit avec flèche 10">
+            <a:extLst>
+              <a:ext uri="{FF2B5EF4-FFF2-40B4-BE49-F238E27FC236}">
+                <a16:creationId xmlns:a16="http://schemas.microsoft.com/office/drawing/2014/main" id="{A0F45036-692E-495B-89C3-84882FACB9E4}"/>
+              </a:ext>
+            </a:extLst>
+          </p:cNvPr>
+          <p:cNvCxnSpPr/>
+          <p:nvPr/>
+        </p:nvCxnSpPr>
+        <p:spPr>
+          <a:xfrm flipH="1">
+            <a:off x="6389511" y="2517422"/>
+            <a:ext cx="1535289" cy="733778"/>
+          </a:xfrm>
+          <a:prstGeom prst="straightConnector1">
+            <a:avLst/>
+          </a:prstGeom>
+          <a:ln>
+            <a:tailEnd type="triangle"/>
+          </a:ln>
+        </p:spPr>
+        <p:style>
+          <a:lnRef idx="1">
+            <a:schemeClr val="accent1"/>
+          </a:lnRef>
+          <a:fillRef idx="0">
+            <a:schemeClr val="accent1"/>
+          </a:fillRef>
+          <a:effectRef idx="0">
+            <a:schemeClr val="accent1"/>
+          </a:effectRef>
+          <a:fontRef idx="minor">
+            <a:schemeClr val="tx1"/>
+          </a:fontRef>
+        </p:style>
+      </p:cxnSp>
+      <p:sp>
+        <p:nvSpPr>
+          <p:cNvPr id="12" name="ZoneTexte 11">
+            <a:extLst>
+              <a:ext uri="{FF2B5EF4-FFF2-40B4-BE49-F238E27FC236}">
+                <a16:creationId xmlns:a16="http://schemas.microsoft.com/office/drawing/2014/main" id="{CB217C5A-111E-45D2-BFDC-F02DF36FC37F}"/>
+              </a:ext>
+            </a:extLst>
+          </p:cNvPr>
+          <p:cNvSpPr txBox="1"/>
+          <p:nvPr/>
+        </p:nvSpPr>
+        <p:spPr>
+          <a:xfrm>
+            <a:off x="8289313" y="2100133"/>
+            <a:ext cx="3348802" cy="369332"/>
+          </a:xfrm>
+          <a:prstGeom prst="rect">
+            <a:avLst/>
+          </a:prstGeom>
+          <a:noFill/>
+        </p:spPr>
+        <p:txBody>
+          <a:bodyPr wrap="none" rtlCol="0">
+            <a:spAutoFit/>
+          </a:bodyPr>
+          <a:lstStyle/>
+          <a:p>
+            <a:r>
+              <a:rPr lang="fr-FR" dirty="0"/>
+              <a:t>Icone reflétant la prévision météo</a:t>
+            </a:r>
+            <a:endParaRPr lang="en-US" dirty="0"/>
+          </a:p>
+        </p:txBody>
+      </p:sp>
+      <p:sp>
+        <p:nvSpPr>
+          <p:cNvPr id="13" name="ZoneTexte 12">
+            <a:extLst>
+              <a:ext uri="{FF2B5EF4-FFF2-40B4-BE49-F238E27FC236}">
+                <a16:creationId xmlns:a16="http://schemas.microsoft.com/office/drawing/2014/main" id="{CF99381B-660D-4DB1-B2AA-71B8CA953085}"/>
+              </a:ext>
+            </a:extLst>
+          </p:cNvPr>
+          <p:cNvSpPr txBox="1"/>
+          <p:nvPr/>
+        </p:nvSpPr>
+        <p:spPr>
+          <a:xfrm>
+            <a:off x="7804485" y="4388536"/>
+            <a:ext cx="3094245" cy="1200329"/>
+          </a:xfrm>
+          <a:prstGeom prst="rect">
+            <a:avLst/>
+          </a:prstGeom>
+          <a:noFill/>
+        </p:spPr>
+        <p:txBody>
+          <a:bodyPr wrap="none" rtlCol="0">
+            <a:spAutoFit/>
+          </a:bodyPr>
+          <a:lstStyle/>
+          <a:p>
+            <a:r>
+              <a:rPr lang="fr-FR" dirty="0"/>
+              <a:t>Symbol définissant la tendance</a:t>
+            </a:r>
+          </a:p>
+          <a:p>
+            <a:r>
+              <a:rPr lang="fr-FR" dirty="0"/>
+              <a:t>+: amélioration</a:t>
+            </a:r>
+          </a:p>
+          <a:p>
+            <a:r>
+              <a:rPr lang="fr-FR" dirty="0"/>
+              <a:t>=: stable</a:t>
+            </a:r>
+          </a:p>
+          <a:p>
+            <a:r>
+              <a:rPr lang="fr-FR" dirty="0"/>
+              <a:t>-: détérioration</a:t>
+            </a:r>
+            <a:endParaRPr lang="en-US" dirty="0"/>
+          </a:p>
+        </p:txBody>
+      </p:sp>
+      <p:cxnSp>
+        <p:nvCxnSpPr>
+          <p:cNvPr id="14" name="Connecteur droit avec flèche 13">
+            <a:extLst>
+              <a:ext uri="{FF2B5EF4-FFF2-40B4-BE49-F238E27FC236}">
+                <a16:creationId xmlns:a16="http://schemas.microsoft.com/office/drawing/2014/main" id="{1B1ACDE9-10F5-48C4-85B9-8782652F6280}"/>
+              </a:ext>
+            </a:extLst>
+          </p:cNvPr>
+          <p:cNvCxnSpPr>
+            <a:cxnSpLocks/>
+          </p:cNvCxnSpPr>
+          <p:nvPr/>
+        </p:nvCxnSpPr>
+        <p:spPr>
+          <a:xfrm flipH="1">
+            <a:off x="6859865" y="4718756"/>
+            <a:ext cx="857269" cy="92956"/>
+          </a:xfrm>
+          <a:prstGeom prst="straightConnector1">
+            <a:avLst/>
+          </a:prstGeom>
+          <a:ln>
+            <a:tailEnd type="triangle"/>
+          </a:ln>
+        </p:spPr>
+        <p:style>
+          <a:lnRef idx="1">
+            <a:schemeClr val="accent1"/>
+          </a:lnRef>
+          <a:fillRef idx="0">
+            <a:schemeClr val="accent1"/>
+          </a:fillRef>
+          <a:effectRef idx="0">
+            <a:schemeClr val="accent1"/>
+          </a:effectRef>
+          <a:fontRef idx="minor">
+            <a:schemeClr val="tx1"/>
+          </a:fontRef>
+        </p:style>
+      </p:cxnSp>
+      <p:sp>
+        <p:nvSpPr>
+          <p:cNvPr id="16" name="ZoneTexte 15">
+            <a:extLst>
+              <a:ext uri="{FF2B5EF4-FFF2-40B4-BE49-F238E27FC236}">
+                <a16:creationId xmlns:a16="http://schemas.microsoft.com/office/drawing/2014/main" id="{37383894-6600-458C-A8F9-27B6C348808C}"/>
+              </a:ext>
+            </a:extLst>
+          </p:cNvPr>
+          <p:cNvSpPr txBox="1"/>
+          <p:nvPr/>
+        </p:nvSpPr>
+        <p:spPr>
+          <a:xfrm>
+            <a:off x="1332143" y="4728631"/>
+            <a:ext cx="2500621" cy="369332"/>
+          </a:xfrm>
+          <a:prstGeom prst="rect">
+            <a:avLst/>
+          </a:prstGeom>
+          <a:noFill/>
+        </p:spPr>
+        <p:txBody>
+          <a:bodyPr wrap="none" rtlCol="0">
+            <a:spAutoFit/>
+          </a:bodyPr>
+          <a:lstStyle/>
+          <a:p>
+            <a:r>
+              <a:rPr lang="fr-FR" dirty="0"/>
+              <a:t>Descriptif de la prévision</a:t>
+            </a:r>
+            <a:endParaRPr lang="en-US" dirty="0"/>
+          </a:p>
+        </p:txBody>
+      </p:sp>
+      <p:cxnSp>
+        <p:nvCxnSpPr>
+          <p:cNvPr id="17" name="Connecteur droit avec flèche 16">
+            <a:extLst>
+              <a:ext uri="{FF2B5EF4-FFF2-40B4-BE49-F238E27FC236}">
+                <a16:creationId xmlns:a16="http://schemas.microsoft.com/office/drawing/2014/main" id="{B6F6E98E-C565-4AF1-98D8-48A3D765D9FE}"/>
+              </a:ext>
+            </a:extLst>
+          </p:cNvPr>
+          <p:cNvCxnSpPr>
+            <a:cxnSpLocks/>
+          </p:cNvCxnSpPr>
+          <p:nvPr/>
+        </p:nvCxnSpPr>
+        <p:spPr>
+          <a:xfrm>
+            <a:off x="3969099" y="4903422"/>
+            <a:ext cx="1363037" cy="9875"/>
+          </a:xfrm>
+          <a:prstGeom prst="straightConnector1">
+            <a:avLst/>
+          </a:prstGeom>
+          <a:ln>
+            <a:tailEnd type="triangle"/>
+          </a:ln>
+        </p:spPr>
+        <p:style>
+          <a:lnRef idx="1">
+            <a:schemeClr val="accent1"/>
+          </a:lnRef>
+          <a:fillRef idx="0">
+            <a:schemeClr val="accent1"/>
+          </a:fillRef>
+          <a:effectRef idx="0">
+            <a:schemeClr val="accent1"/>
+          </a:effectRef>
+          <a:fontRef idx="minor">
+            <a:schemeClr val="tx1"/>
+          </a:fontRef>
+        </p:style>
+      </p:cxnSp>
+      <p:sp>
+        <p:nvSpPr>
+          <p:cNvPr id="20" name="ZoneTexte 19">
+            <a:extLst>
+              <a:ext uri="{FF2B5EF4-FFF2-40B4-BE49-F238E27FC236}">
+                <a16:creationId xmlns:a16="http://schemas.microsoft.com/office/drawing/2014/main" id="{D3111DF7-5D3B-4177-AB3F-4C64431D3A76}"/>
+              </a:ext>
+            </a:extLst>
+          </p:cNvPr>
+          <p:cNvSpPr txBox="1"/>
+          <p:nvPr/>
+        </p:nvSpPr>
+        <p:spPr>
+          <a:xfrm>
+            <a:off x="1150503" y="5733265"/>
+            <a:ext cx="3078150" cy="369332"/>
+          </a:xfrm>
+          <a:prstGeom prst="rect">
+            <a:avLst/>
+          </a:prstGeom>
+          <a:noFill/>
+        </p:spPr>
+        <p:txBody>
+          <a:bodyPr wrap="none" rtlCol="0">
+            <a:spAutoFit/>
+          </a:bodyPr>
+          <a:lstStyle/>
+          <a:p>
+            <a:r>
+              <a:rPr lang="fr-FR" dirty="0"/>
+              <a:t>Mesures provenant du capteur</a:t>
+            </a:r>
+          </a:p>
+        </p:txBody>
+      </p:sp>
+      <p:sp>
+        <p:nvSpPr>
+          <p:cNvPr id="21" name="Accolade ouvrante 20">
+            <a:extLst>
+              <a:ext uri="{FF2B5EF4-FFF2-40B4-BE49-F238E27FC236}">
+                <a16:creationId xmlns:a16="http://schemas.microsoft.com/office/drawing/2014/main" id="{3EB69875-D8F0-42FF-BE5D-A047EFB9B143}"/>
+              </a:ext>
+            </a:extLst>
+          </p:cNvPr>
+          <p:cNvSpPr/>
+          <p:nvPr/>
+        </p:nvSpPr>
+        <p:spPr>
+          <a:xfrm>
+            <a:off x="4431323" y="5575393"/>
+            <a:ext cx="45719" cy="685077"/>
+          </a:xfrm>
+          <a:prstGeom prst="leftBrace">
+            <a:avLst/>
+          </a:prstGeom>
+        </p:spPr>
+        <p:style>
+          <a:lnRef idx="1">
+            <a:schemeClr val="accent1"/>
+          </a:lnRef>
+          <a:fillRef idx="0">
+            <a:schemeClr val="accent1"/>
+          </a:fillRef>
+          <a:effectRef idx="0">
+            <a:schemeClr val="accent1"/>
+          </a:effectRef>
+          <a:fontRef idx="minor">
+            <a:schemeClr val="tx1"/>
+          </a:fontRef>
+        </p:style>
+        <p:txBody>
+          <a:bodyPr rtlCol="0" anchor="ctr"/>
+          <a:lstStyle/>
+          <a:p>
+            <a:pPr algn="ctr"/>
+            <a:endParaRPr lang="en-US"/>
+          </a:p>
+        </p:txBody>
+      </p:sp>
     </p:spTree>
     <p:extLst>
       <p:ext uri="{BB962C8B-B14F-4D97-AF65-F5344CB8AC3E}">
-        <p14:creationId xmlns:p14="http://schemas.microsoft.com/office/powerpoint/2010/main" val="4187350031"/>
+        <p14:creationId xmlns:p14="http://schemas.microsoft.com/office/powerpoint/2010/main" val="4246114347"/>
       </p:ext>
     </p:extLst>
   </p:cSld>
@@ -5918,7 +8461,7 @@
           <a:p>
             <a:r>
               <a:rPr lang="fr-FR" dirty="0"/>
-              <a:t>Interface graphique: diagramme de séquence</a:t>
+              <a:t>Interface graphique: diagramme de classe</a:t>
             </a:r>
             <a:endParaRPr lang="en-US" dirty="0"/>
           </a:p>
@@ -5953,10 +8496,40 @@
           </a:p>
         </p:txBody>
       </p:sp>
+      <p:pic>
+        <p:nvPicPr>
+          <p:cNvPr id="3" name="Image 2">
+            <a:extLst>
+              <a:ext uri="{FF2B5EF4-FFF2-40B4-BE49-F238E27FC236}">
+                <a16:creationId xmlns:a16="http://schemas.microsoft.com/office/drawing/2014/main" id="{7F486239-586A-4778-8022-A3E939324F09}"/>
+              </a:ext>
+            </a:extLst>
+          </p:cNvPr>
+          <p:cNvPicPr>
+            <a:picLocks noChangeAspect="1"/>
+          </p:cNvPicPr>
+          <p:nvPr/>
+        </p:nvPicPr>
+        <p:blipFill>
+          <a:blip r:embed="rId2"/>
+          <a:stretch>
+            <a:fillRect/>
+          </a:stretch>
+        </p:blipFill>
+        <p:spPr>
+          <a:xfrm>
+            <a:off x="1719262" y="1386682"/>
+            <a:ext cx="8143875" cy="5172075"/>
+          </a:xfrm>
+          <a:prstGeom prst="rect">
+            <a:avLst/>
+          </a:prstGeom>
+        </p:spPr>
+      </p:pic>
     </p:spTree>
     <p:extLst>
       <p:ext uri="{BB962C8B-B14F-4D97-AF65-F5344CB8AC3E}">
-        <p14:creationId xmlns:p14="http://schemas.microsoft.com/office/powerpoint/2010/main" val="2799269177"/>
+        <p14:creationId xmlns:p14="http://schemas.microsoft.com/office/powerpoint/2010/main" val="4187350031"/>
       </p:ext>
     </p:extLst>
   </p:cSld>
@@ -6011,7 +8584,7 @@
           <a:p>
             <a:r>
               <a:rPr lang="fr-FR" dirty="0"/>
-              <a:t>Historisation des métriques météo</a:t>
+              <a:t>Interface graphique: diagramme de séquence</a:t>
             </a:r>
             <a:endParaRPr lang="en-US" dirty="0"/>
           </a:p>
@@ -6049,7 +8622,7 @@
     </p:spTree>
     <p:extLst>
       <p:ext uri="{BB962C8B-B14F-4D97-AF65-F5344CB8AC3E}">
-        <p14:creationId xmlns:p14="http://schemas.microsoft.com/office/powerpoint/2010/main" val="3829008188"/>
+        <p14:creationId xmlns:p14="http://schemas.microsoft.com/office/powerpoint/2010/main" val="2799269177"/>
       </p:ext>
     </p:extLst>
   </p:cSld>

</xml_diff>